<commit_message>
fix typo in chapter 9 slides
</commit_message>
<xml_diff>
--- a/slides/chap9-mln.pptx
+++ b/slides/chap9-mln.pptx
@@ -5135,7 +5135,7 @@
         <p:spPr bwMode="auto">
           <a:xfrm>
             <a:off x="914400" y="5867400"/>
-            <a:ext cx="6759575" cy="641350"/>
+            <a:ext cx="6888838" cy="646331"/>
           </a:xfrm>
           <a:prstGeom prst="rect">
             <a:avLst/>
@@ -5160,14 +5160,54 @@
           <a:lstStyle/>
           <a:p>
             <a:r>
-              <a:rPr lang="en-US"/>
-              <a:t>some values: P(spam)=3/10, P(not spam)=7/10, P(the|spam)=1, </a:t>
-            </a:r>
-          </a:p>
-          <a:p>
-            <a:r>
-              <a:rPr lang="en-US"/>
-              <a:t>P(the|not spam)=1,P(dinner|spam)=0, P(dinner|not spam)=1/7,…</a:t>
+              <a:rPr lang="en-US" dirty="0"/>
+              <a:t>some values: P(spam)=3/10, P(not spam)=7/10, P(</a:t>
+            </a:r>
+            <a:r>
+              <a:rPr lang="en-US" dirty="0" err="1"/>
+              <a:t>the|spam</a:t>
+            </a:r>
+            <a:r>
+              <a:rPr lang="en-US" dirty="0"/>
+              <a:t>)=1, </a:t>
+            </a:r>
+          </a:p>
+          <a:p>
+            <a:r>
+              <a:rPr lang="en-US" dirty="0"/>
+              <a:t>P(</a:t>
+            </a:r>
+            <a:r>
+              <a:rPr lang="en-US" dirty="0" err="1"/>
+              <a:t>the|not</a:t>
+            </a:r>
+            <a:r>
+              <a:rPr lang="en-US" dirty="0"/>
+              <a:t> spam)=1</a:t>
+            </a:r>
+            <a:r>
+              <a:rPr lang="en-US" dirty="0" smtClean="0"/>
+              <a:t>, P</a:t>
+            </a:r>
+            <a:r>
+              <a:rPr lang="en-US" dirty="0"/>
+              <a:t>(</a:t>
+            </a:r>
+            <a:r>
+              <a:rPr lang="en-US" dirty="0" err="1"/>
+              <a:t>dinner|spam</a:t>
+            </a:r>
+            <a:r>
+              <a:rPr lang="en-US" dirty="0"/>
+              <a:t>)=0, P(</a:t>
+            </a:r>
+            <a:r>
+              <a:rPr lang="en-US" dirty="0" err="1"/>
+              <a:t>dinner|not</a:t>
+            </a:r>
+            <a:r>
+              <a:rPr lang="en-US" dirty="0"/>
+              <a:t> spam)=1/7,…</a:t>
             </a:r>
           </a:p>
         </p:txBody>
@@ -21673,7 +21713,7 @@
           <a:graphicData uri="http://schemas.openxmlformats.org/presentationml/2006/ole">
             <mc:AlternateContent xmlns:mc="http://schemas.openxmlformats.org/markup-compatibility/2006">
               <mc:Choice xmlns:v="urn:schemas-microsoft-com:vml" Requires="v">
-                <p:oleObj spid="_x0000_s2078" name="Acrobat Document" r:id="rId3" imgW="5118100" imgH="6146800" progId="">
+                <p:oleObj spid="_x0000_s2079" name="Acrobat Document" r:id="rId3" imgW="5118100" imgH="6146800" progId="">
                   <p:embed/>
                 </p:oleObj>
               </mc:Choice>
@@ -21995,7 +22035,7 @@
           <a:graphicData uri="http://schemas.openxmlformats.org/presentationml/2006/ole">
             <mc:AlternateContent xmlns:mc="http://schemas.openxmlformats.org/markup-compatibility/2006">
               <mc:Choice xmlns:v="urn:schemas-microsoft-com:vml" Requires="v">
-                <p:oleObj spid="_x0000_s1054" name="Acrobat Document" r:id="rId3" imgW="4775200" imgH="3314700" progId="">
+                <p:oleObj spid="_x0000_s1055" name="Acrobat Document" r:id="rId3" imgW="4775200" imgH="3314700" progId="">
                   <p:embed/>
                 </p:oleObj>
               </mc:Choice>
@@ -22532,7 +22572,7 @@
           <a:graphicData uri="http://schemas.openxmlformats.org/presentationml/2006/ole">
             <mc:AlternateContent xmlns:mc="http://schemas.openxmlformats.org/markup-compatibility/2006">
               <mc:Choice xmlns:v="urn:schemas-microsoft-com:vml" Requires="v">
-                <p:oleObj spid="_x0000_s3102" name="Acrobat Document" r:id="rId3" imgW="3695700" imgH="4445000" progId="">
+                <p:oleObj spid="_x0000_s3103" name="Acrobat Document" r:id="rId3" imgW="3695700" imgH="4445000" progId="">
                   <p:embed/>
                 </p:oleObj>
               </mc:Choice>

</xml_diff>

<commit_message>
added confusion matrix slide
</commit_message>
<xml_diff>
--- a/slides/chap9-mln.pptx
+++ b/slides/chap9-mln.pptx
@@ -5,7 +5,7 @@
     <p:sldMasterId id="2147483648" r:id="rId1"/>
   </p:sldMasterIdLst>
   <p:notesMasterIdLst>
-    <p:notesMasterId r:id="rId75"/>
+    <p:notesMasterId r:id="rId76"/>
   </p:notesMasterIdLst>
   <p:sldIdLst>
     <p:sldId id="257" r:id="rId2"/>
@@ -40,47 +40,48 @@
     <p:sldId id="283" r:id="rId31"/>
     <p:sldId id="318" r:id="rId32"/>
     <p:sldId id="284" r:id="rId33"/>
-    <p:sldId id="285" r:id="rId34"/>
-    <p:sldId id="317" r:id="rId35"/>
-    <p:sldId id="263" r:id="rId36"/>
-    <p:sldId id="264" r:id="rId37"/>
-    <p:sldId id="286" r:id="rId38"/>
-    <p:sldId id="316" r:id="rId39"/>
-    <p:sldId id="326" r:id="rId40"/>
-    <p:sldId id="289" r:id="rId41"/>
-    <p:sldId id="287" r:id="rId42"/>
-    <p:sldId id="266" r:id="rId43"/>
-    <p:sldId id="320" r:id="rId44"/>
-    <p:sldId id="265" r:id="rId45"/>
-    <p:sldId id="288" r:id="rId46"/>
-    <p:sldId id="319" r:id="rId47"/>
-    <p:sldId id="267" r:id="rId48"/>
-    <p:sldId id="290" r:id="rId49"/>
-    <p:sldId id="321" r:id="rId50"/>
-    <p:sldId id="268" r:id="rId51"/>
-    <p:sldId id="291" r:id="rId52"/>
-    <p:sldId id="327" r:id="rId53"/>
-    <p:sldId id="322" r:id="rId54"/>
-    <p:sldId id="292" r:id="rId55"/>
-    <p:sldId id="272" r:id="rId56"/>
-    <p:sldId id="323" r:id="rId57"/>
-    <p:sldId id="275" r:id="rId58"/>
-    <p:sldId id="276" r:id="rId59"/>
-    <p:sldId id="324" r:id="rId60"/>
-    <p:sldId id="271" r:id="rId61"/>
-    <p:sldId id="302" r:id="rId62"/>
-    <p:sldId id="293" r:id="rId63"/>
-    <p:sldId id="303" r:id="rId64"/>
-    <p:sldId id="331" r:id="rId65"/>
-    <p:sldId id="332" r:id="rId66"/>
-    <p:sldId id="333" r:id="rId67"/>
-    <p:sldId id="294" r:id="rId68"/>
-    <p:sldId id="273" r:id="rId69"/>
-    <p:sldId id="295" r:id="rId70"/>
-    <p:sldId id="296" r:id="rId71"/>
-    <p:sldId id="274" r:id="rId72"/>
-    <p:sldId id="297" r:id="rId73"/>
-    <p:sldId id="325" r:id="rId74"/>
+    <p:sldId id="334" r:id="rId34"/>
+    <p:sldId id="285" r:id="rId35"/>
+    <p:sldId id="317" r:id="rId36"/>
+    <p:sldId id="263" r:id="rId37"/>
+    <p:sldId id="264" r:id="rId38"/>
+    <p:sldId id="286" r:id="rId39"/>
+    <p:sldId id="316" r:id="rId40"/>
+    <p:sldId id="326" r:id="rId41"/>
+    <p:sldId id="289" r:id="rId42"/>
+    <p:sldId id="287" r:id="rId43"/>
+    <p:sldId id="266" r:id="rId44"/>
+    <p:sldId id="320" r:id="rId45"/>
+    <p:sldId id="265" r:id="rId46"/>
+    <p:sldId id="288" r:id="rId47"/>
+    <p:sldId id="319" r:id="rId48"/>
+    <p:sldId id="267" r:id="rId49"/>
+    <p:sldId id="290" r:id="rId50"/>
+    <p:sldId id="321" r:id="rId51"/>
+    <p:sldId id="268" r:id="rId52"/>
+    <p:sldId id="291" r:id="rId53"/>
+    <p:sldId id="327" r:id="rId54"/>
+    <p:sldId id="322" r:id="rId55"/>
+    <p:sldId id="292" r:id="rId56"/>
+    <p:sldId id="272" r:id="rId57"/>
+    <p:sldId id="323" r:id="rId58"/>
+    <p:sldId id="275" r:id="rId59"/>
+    <p:sldId id="276" r:id="rId60"/>
+    <p:sldId id="324" r:id="rId61"/>
+    <p:sldId id="271" r:id="rId62"/>
+    <p:sldId id="302" r:id="rId63"/>
+    <p:sldId id="293" r:id="rId64"/>
+    <p:sldId id="303" r:id="rId65"/>
+    <p:sldId id="331" r:id="rId66"/>
+    <p:sldId id="332" r:id="rId67"/>
+    <p:sldId id="333" r:id="rId68"/>
+    <p:sldId id="294" r:id="rId69"/>
+    <p:sldId id="273" r:id="rId70"/>
+    <p:sldId id="295" r:id="rId71"/>
+    <p:sldId id="296" r:id="rId72"/>
+    <p:sldId id="274" r:id="rId73"/>
+    <p:sldId id="297" r:id="rId74"/>
+    <p:sldId id="325" r:id="rId75"/>
   </p:sldIdLst>
   <p:sldSz cx="9144000" cy="6858000" type="screen4x3"/>
   <p:notesSz cx="6858000" cy="9144000"/>
@@ -863,10 +864,10 @@
           <a:bodyPr/>
           <a:lstStyle/>
           <a:p>
-            <a:fld id="{5ABAF8CC-EAE1-494C-ACB2-5409740A39AB}" type="slidenum">
+            <a:fld id="{EECC1432-0E66-4742-B674-FEB7C2C8C4DC}" type="slidenum">
               <a:rPr lang="en-US"/>
               <a:pPr/>
-              <a:t>64</a:t>
+              <a:t>33</a:t>
             </a:fld>
             <a:endParaRPr lang="en-US"/>
           </a:p>
@@ -874,7 +875,7 @@
       </p:sp>
       <p:sp>
         <p:nvSpPr>
-          <p:cNvPr id="26626" name="Rectangle 2"/>
+          <p:cNvPr id="114690" name="Rectangle 2"/>
           <p:cNvSpPr>
             <a:spLocks noGrp="1" noRot="1" noChangeAspect="1" noChangeArrowheads="1" noTextEdit="1"/>
           </p:cNvSpPr>
@@ -893,7 +894,7 @@
       </p:sp>
       <p:sp>
         <p:nvSpPr>
-          <p:cNvPr id="26627" name="Rectangle 3"/>
+          <p:cNvPr id="114691" name="Rectangle 3"/>
           <p:cNvSpPr>
             <a:spLocks noGrp="1" noChangeArrowheads="1"/>
           </p:cNvSpPr>
@@ -952,7 +953,7 @@
           <a:bodyPr/>
           <a:lstStyle/>
           <a:p>
-            <a:fld id="{0FF3B0F0-E823-9B44-B61B-00675FC2E455}" type="slidenum">
+            <a:fld id="{5ABAF8CC-EAE1-494C-ACB2-5409740A39AB}" type="slidenum">
               <a:rPr lang="en-US"/>
               <a:pPr/>
               <a:t>65</a:t>
@@ -963,7 +964,7 @@
       </p:sp>
       <p:sp>
         <p:nvSpPr>
-          <p:cNvPr id="27650" name="Rectangle 2"/>
+          <p:cNvPr id="26626" name="Rectangle 2"/>
           <p:cNvSpPr>
             <a:spLocks noGrp="1" noRot="1" noChangeAspect="1" noChangeArrowheads="1" noTextEdit="1"/>
           </p:cNvSpPr>
@@ -982,7 +983,7 @@
       </p:sp>
       <p:sp>
         <p:nvSpPr>
-          <p:cNvPr id="27651" name="Rectangle 3"/>
+          <p:cNvPr id="26627" name="Rectangle 3"/>
           <p:cNvSpPr>
             <a:spLocks noGrp="1" noChangeArrowheads="1"/>
           </p:cNvSpPr>
@@ -1041,10 +1042,99 @@
           <a:bodyPr/>
           <a:lstStyle/>
           <a:p>
+            <a:fld id="{0FF3B0F0-E823-9B44-B61B-00675FC2E455}" type="slidenum">
+              <a:rPr lang="en-US"/>
+              <a:pPr/>
+              <a:t>66</a:t>
+            </a:fld>
+            <a:endParaRPr lang="en-US"/>
+          </a:p>
+        </p:txBody>
+      </p:sp>
+      <p:sp>
+        <p:nvSpPr>
+          <p:cNvPr id="27650" name="Rectangle 2"/>
+          <p:cNvSpPr>
+            <a:spLocks noGrp="1" noRot="1" noChangeAspect="1" noChangeArrowheads="1" noTextEdit="1"/>
+          </p:cNvSpPr>
+          <p:nvPr>
+            <p:ph type="sldImg"/>
+          </p:nvPr>
+        </p:nvSpPr>
+        <p:spPr>
+          <a:ln/>
+          <a:extLst>
+            <a:ext uri="{FAA26D3D-D897-4be2-8F04-BA451C77F1D7}">
+              <ma14:placeholderFlag xmlns:ma14="http://schemas.microsoft.com/office/mac/drawingml/2011/main" val="1"/>
+            </a:ext>
+          </a:extLst>
+        </p:spPr>
+      </p:sp>
+      <p:sp>
+        <p:nvSpPr>
+          <p:cNvPr id="27651" name="Rectangle 3"/>
+          <p:cNvSpPr>
+            <a:spLocks noGrp="1" noChangeArrowheads="1"/>
+          </p:cNvSpPr>
+          <p:nvPr>
+            <p:ph type="body" idx="1"/>
+          </p:nvPr>
+        </p:nvSpPr>
+        <p:spPr/>
+        <p:txBody>
+          <a:bodyPr/>
+          <a:lstStyle/>
+          <a:p>
+            <a:endParaRPr lang="en-US"/>
+          </a:p>
+        </p:txBody>
+      </p:sp>
+    </p:spTree>
+  </p:cSld>
+  <p:clrMapOvr>
+    <a:masterClrMapping/>
+  </p:clrMapOvr>
+</p:notes>
+</file>
+
+<file path=ppt/notesSlides/notesSlide7.xml><?xml version="1.0" encoding="utf-8"?>
+<p:notes xmlns:a="http://schemas.openxmlformats.org/drawingml/2006/main" xmlns:r="http://schemas.openxmlformats.org/officeDocument/2006/relationships" xmlns:p="http://schemas.openxmlformats.org/presentationml/2006/main">
+  <p:cSld>
+    <p:spTree>
+      <p:nvGrpSpPr>
+        <p:cNvPr id="1" name=""/>
+        <p:cNvGrpSpPr/>
+        <p:nvPr/>
+      </p:nvGrpSpPr>
+      <p:grpSpPr>
+        <a:xfrm>
+          <a:off x="0" y="0"/>
+          <a:ext cx="0" cy="0"/>
+          <a:chOff x="0" y="0"/>
+          <a:chExt cx="0" cy="0"/>
+        </a:xfrm>
+      </p:grpSpPr>
+      <p:sp>
+        <p:nvSpPr>
+          <p:cNvPr id="7" name="Rectangle 7"/>
+          <p:cNvSpPr>
+            <a:spLocks noGrp="1" noChangeArrowheads="1"/>
+          </p:cNvSpPr>
+          <p:nvPr>
+            <p:ph type="sldNum" sz="quarter" idx="5"/>
+          </p:nvPr>
+        </p:nvSpPr>
+        <p:spPr>
+          <a:ln/>
+        </p:spPr>
+        <p:txBody>
+          <a:bodyPr/>
+          <a:lstStyle/>
+          <a:p>
             <a:fld id="{4F6B2B3F-630D-D84D-91E9-FDF8F16953ED}" type="slidenum">
               <a:rPr lang="en-US"/>
               <a:pPr/>
-              <a:t>66</a:t>
+              <a:t>67</a:t>
             </a:fld>
             <a:endParaRPr lang="en-US"/>
           </a:p>
@@ -14824,6 +14914,230 @@
       </p:grpSpPr>
       <p:sp>
         <p:nvSpPr>
+          <p:cNvPr id="113666" name="Rectangle 2"/>
+          <p:cNvSpPr>
+            <a:spLocks noGrp="1" noChangeArrowheads="1"/>
+          </p:cNvSpPr>
+          <p:nvPr>
+            <p:ph type="title"/>
+          </p:nvPr>
+        </p:nvSpPr>
+        <p:spPr>
+          <a:ln>
+            <a:solidFill>
+              <a:srgbClr val="00FFFF"/>
+            </a:solidFill>
+          </a:ln>
+        </p:spPr>
+        <p:txBody>
+          <a:bodyPr/>
+          <a:lstStyle/>
+          <a:p>
+            <a:r>
+              <a:rPr lang="en-US" dirty="0" smtClean="0"/>
+              <a:t>Confusion Matrix</a:t>
+            </a:r>
+            <a:endParaRPr lang="en-US" dirty="0"/>
+          </a:p>
+        </p:txBody>
+      </p:sp>
+      <p:pic>
+        <p:nvPicPr>
+          <p:cNvPr id="5" name="Picture 4"/>
+          <p:cNvPicPr>
+            <a:picLocks noChangeAspect="1"/>
+          </p:cNvPicPr>
+          <p:nvPr/>
+        </p:nvPicPr>
+        <p:blipFill>
+          <a:blip r:embed="rId3"/>
+          <a:stretch>
+            <a:fillRect/>
+          </a:stretch>
+        </p:blipFill>
+        <p:spPr>
+          <a:xfrm>
+            <a:off x="1475656" y="3356992"/>
+            <a:ext cx="7531100" cy="2921000"/>
+          </a:xfrm>
+          <a:prstGeom prst="rect">
+            <a:avLst/>
+          </a:prstGeom>
+        </p:spPr>
+      </p:pic>
+      <p:pic>
+        <p:nvPicPr>
+          <p:cNvPr id="4" name="Picture 3"/>
+          <p:cNvPicPr>
+            <a:picLocks noChangeAspect="1"/>
+          </p:cNvPicPr>
+          <p:nvPr/>
+        </p:nvPicPr>
+        <p:blipFill>
+          <a:blip r:embed="rId4"/>
+          <a:stretch>
+            <a:fillRect/>
+          </a:stretch>
+        </p:blipFill>
+        <p:spPr>
+          <a:xfrm>
+            <a:off x="3572" y="1772816"/>
+            <a:ext cx="4073595" cy="2376264"/>
+          </a:xfrm>
+          <a:prstGeom prst="rect">
+            <a:avLst/>
+          </a:prstGeom>
+        </p:spPr>
+      </p:pic>
+      <p:sp>
+        <p:nvSpPr>
+          <p:cNvPr id="6" name="TextBox 5"/>
+          <p:cNvSpPr txBox="1"/>
+          <p:nvPr/>
+        </p:nvSpPr>
+        <p:spPr>
+          <a:xfrm>
+            <a:off x="2843808" y="6453336"/>
+            <a:ext cx="3298048" cy="276999"/>
+          </a:xfrm>
+          <a:prstGeom prst="rect">
+            <a:avLst/>
+          </a:prstGeom>
+          <a:noFill/>
+        </p:spPr>
+        <p:txBody>
+          <a:bodyPr wrap="none" rtlCol="0">
+            <a:spAutoFit/>
+          </a:bodyPr>
+          <a:lstStyle/>
+          <a:p>
+            <a:r>
+              <a:rPr lang="en-US" sz="1200" dirty="0">
+                <a:hlinkClick r:id="rId5"/>
+              </a:rPr>
+              <a:t>https://en.wikipedia.org/wiki/</a:t>
+            </a:r>
+            <a:r>
+              <a:rPr lang="en-US" sz="1200" dirty="0" smtClean="0">
+                <a:hlinkClick r:id="rId5"/>
+              </a:rPr>
+              <a:t>Confusion_matrix</a:t>
+            </a:r>
+            <a:r>
+              <a:rPr lang="en-US" sz="1200" dirty="0" smtClean="0"/>
+              <a:t> </a:t>
+            </a:r>
+            <a:endParaRPr lang="en-US" sz="1200" dirty="0"/>
+          </a:p>
+        </p:txBody>
+      </p:sp>
+    </p:spTree>
+    <p:extLst>
+      <p:ext uri="{BB962C8B-B14F-4D97-AF65-F5344CB8AC3E}">
+        <p14:creationId xmlns:p14="http://schemas.microsoft.com/office/powerpoint/2010/main" val="876425041"/>
+      </p:ext>
+    </p:extLst>
+  </p:cSld>
+  <p:clrMapOvr>
+    <a:masterClrMapping/>
+  </p:clrMapOvr>
+  <p:timing>
+    <p:tnLst>
+      <p:par>
+        <p:cTn xmlns:p14="http://schemas.microsoft.com/office/powerpoint/2010/main" id="1" dur="indefinite" restart="never" nodeType="tmRoot">
+          <p:childTnLst>
+            <p:seq concurrent="1" nextAc="seek">
+              <p:cTn id="2" dur="indefinite" nodeType="mainSeq">
+                <p:childTnLst>
+                  <p:par>
+                    <p:cTn id="3" fill="hold">
+                      <p:stCondLst>
+                        <p:cond delay="indefinite"/>
+                      </p:stCondLst>
+                      <p:childTnLst>
+                        <p:par>
+                          <p:cTn id="4" fill="hold">
+                            <p:stCondLst>
+                              <p:cond delay="0"/>
+                            </p:stCondLst>
+                            <p:childTnLst>
+                              <p:par>
+                                <p:cTn id="5" presetID="1" presetClass="entr" presetSubtype="0" fill="hold" nodeType="clickEffect">
+                                  <p:stCondLst>
+                                    <p:cond delay="0"/>
+                                  </p:stCondLst>
+                                  <p:childTnLst>
+                                    <p:set>
+                                      <p:cBhvr>
+                                        <p:cTn id="6" dur="1" fill="hold">
+                                          <p:stCondLst>
+                                            <p:cond delay="0"/>
+                                          </p:stCondLst>
+                                        </p:cTn>
+                                        <p:tgtEl>
+                                          <p:spTgt spid="5"/>
+                                        </p:tgtEl>
+                                        <p:attrNameLst>
+                                          <p:attrName>style.visibility</p:attrName>
+                                        </p:attrNameLst>
+                                      </p:cBhvr>
+                                      <p:to>
+                                        <p:strVal val="visible"/>
+                                      </p:to>
+                                    </p:set>
+                                  </p:childTnLst>
+                                </p:cTn>
+                              </p:par>
+                            </p:childTnLst>
+                          </p:cTn>
+                        </p:par>
+                      </p:childTnLst>
+                    </p:cTn>
+                  </p:par>
+                </p:childTnLst>
+              </p:cTn>
+              <p:prevCondLst>
+                <p:cond evt="onPrev" delay="0">
+                  <p:tgtEl>
+                    <p:sldTgt/>
+                  </p:tgtEl>
+                </p:cond>
+              </p:prevCondLst>
+              <p:nextCondLst>
+                <p:cond evt="onNext" delay="0">
+                  <p:tgtEl>
+                    <p:sldTgt/>
+                  </p:tgtEl>
+                </p:cond>
+              </p:nextCondLst>
+            </p:seq>
+          </p:childTnLst>
+        </p:cTn>
+      </p:par>
+    </p:tnLst>
+  </p:timing>
+</p:sld>
+</file>
+
+<file path=ppt/slides/slide34.xml><?xml version="1.0" encoding="utf-8"?>
+<p:sld xmlns:a="http://schemas.openxmlformats.org/drawingml/2006/main" xmlns:r="http://schemas.openxmlformats.org/officeDocument/2006/relationships" xmlns:p="http://schemas.openxmlformats.org/presentationml/2006/main">
+  <p:cSld>
+    <p:spTree>
+      <p:nvGrpSpPr>
+        <p:cNvPr id="1" name=""/>
+        <p:cNvGrpSpPr/>
+        <p:nvPr/>
+      </p:nvGrpSpPr>
+      <p:grpSpPr>
+        <a:xfrm>
+          <a:off x="0" y="0"/>
+          <a:ext cx="0" cy="0"/>
+          <a:chOff x="0" y="0"/>
+          <a:chExt cx="0" cy="0"/>
+        </a:xfrm>
+      </p:grpSpPr>
+      <p:sp>
+        <p:nvSpPr>
           <p:cNvPr id="43009" name="Title 1"/>
           <p:cNvSpPr>
             <a:spLocks noGrp="1"/>
@@ -14929,7 +15243,7 @@
 </p:sld>
 </file>
 
-<file path=ppt/slides/slide34.xml><?xml version="1.0" encoding="utf-8"?>
+<file path=ppt/slides/slide35.xml><?xml version="1.0" encoding="utf-8"?>
 <p:sld xmlns:a="http://schemas.openxmlformats.org/drawingml/2006/main" xmlns:r="http://schemas.openxmlformats.org/officeDocument/2006/relationships" xmlns:p="http://schemas.openxmlformats.org/presentationml/2006/main">
   <p:cSld>
     <p:spTree>
@@ -15269,7 +15583,7 @@
 </p:sld>
 </file>
 
-<file path=ppt/slides/slide35.xml><?xml version="1.0" encoding="utf-8"?>
+<file path=ppt/slides/slide36.xml><?xml version="1.0" encoding="utf-8"?>
 <p:sld xmlns:a="http://schemas.openxmlformats.org/drawingml/2006/main" xmlns:r="http://schemas.openxmlformats.org/officeDocument/2006/relationships" xmlns:p="http://schemas.openxmlformats.org/presentationml/2006/main">
   <p:cSld>
     <p:spTree>
@@ -16861,7 +17175,7 @@
 </p:sld>
 </file>
 
-<file path=ppt/slides/slide36.xml><?xml version="1.0" encoding="utf-8"?>
+<file path=ppt/slides/slide37.xml><?xml version="1.0" encoding="utf-8"?>
 <p:sld xmlns:a="http://schemas.openxmlformats.org/drawingml/2006/main" xmlns:r="http://schemas.openxmlformats.org/officeDocument/2006/relationships" xmlns:p="http://schemas.openxmlformats.org/presentationml/2006/main">
   <p:cSld>
     <p:spTree>
@@ -20194,7 +20508,7 @@
 </p:sld>
 </file>
 
-<file path=ppt/slides/slide37.xml><?xml version="1.0" encoding="utf-8"?>
+<file path=ppt/slides/slide38.xml><?xml version="1.0" encoding="utf-8"?>
 <p:sld xmlns:a="http://schemas.openxmlformats.org/drawingml/2006/main" xmlns:r="http://schemas.openxmlformats.org/officeDocument/2006/relationships" xmlns:p="http://schemas.openxmlformats.org/presentationml/2006/main">
   <p:cSld>
     <p:spTree>
@@ -20287,7 +20601,7 @@
 </p:sld>
 </file>
 
-<file path=ppt/slides/slide38.xml><?xml version="1.0" encoding="utf-8"?>
+<file path=ppt/slides/slide39.xml><?xml version="1.0" encoding="utf-8"?>
 <p:sld xmlns:a="http://schemas.openxmlformats.org/drawingml/2006/main" xmlns:r="http://schemas.openxmlformats.org/officeDocument/2006/relationships" xmlns:p="http://schemas.openxmlformats.org/presentationml/2006/main">
   <p:cSld>
     <p:spTree>
@@ -20619,7 +20933,270 @@
 </p:sld>
 </file>
 
-<file path=ppt/slides/slide39.xml><?xml version="1.0" encoding="utf-8"?>
+<file path=ppt/slides/slide4.xml><?xml version="1.0" encoding="utf-8"?>
+<p:sld xmlns:a="http://schemas.openxmlformats.org/drawingml/2006/main" xmlns:r="http://schemas.openxmlformats.org/officeDocument/2006/relationships" xmlns:p="http://schemas.openxmlformats.org/presentationml/2006/main">
+  <p:cSld>
+    <p:spTree>
+      <p:nvGrpSpPr>
+        <p:cNvPr id="1" name=""/>
+        <p:cNvGrpSpPr/>
+        <p:nvPr/>
+      </p:nvGrpSpPr>
+      <p:grpSpPr>
+        <a:xfrm>
+          <a:off x="0" y="0"/>
+          <a:ext cx="0" cy="0"/>
+          <a:chOff x="0" y="0"/>
+          <a:chExt cx="0" cy="0"/>
+        </a:xfrm>
+      </p:grpSpPr>
+      <p:sp>
+        <p:nvSpPr>
+          <p:cNvPr id="16385" name="Title 1"/>
+          <p:cNvSpPr>
+            <a:spLocks noGrp="1"/>
+          </p:cNvSpPr>
+          <p:nvPr>
+            <p:ph type="title"/>
+          </p:nvPr>
+        </p:nvSpPr>
+        <p:spPr/>
+        <p:txBody>
+          <a:bodyPr/>
+          <a:lstStyle/>
+          <a:p>
+            <a:r>
+              <a:rPr lang="en-US" smtClean="0"/>
+              <a:t>How to Classify?</a:t>
+            </a:r>
+          </a:p>
+        </p:txBody>
+      </p:sp>
+      <p:sp>
+        <p:nvSpPr>
+          <p:cNvPr id="3" name="Content Placeholder 2"/>
+          <p:cNvSpPr>
+            <a:spLocks noGrp="1"/>
+          </p:cNvSpPr>
+          <p:nvPr>
+            <p:ph idx="1"/>
+          </p:nvPr>
+        </p:nvSpPr>
+        <p:spPr/>
+        <p:txBody>
+          <a:bodyPr rtlCol="0">
+            <a:normAutofit fontScale="92500" lnSpcReduction="20000"/>
+          </a:bodyPr>
+          <a:lstStyle/>
+          <a:p>
+            <a:pPr fontAlgn="auto">
+              <a:spcAft>
+                <a:spcPts val="0"/>
+              </a:spcAft>
+              <a:buFont typeface="Arial" pitchFamily="34" charset="0"/>
+              <a:buChar char="•"/>
+              <a:defRPr/>
+            </a:pPr>
+            <a:r>
+              <a:rPr lang="en-US" dirty="0" smtClean="0">
+                <a:ea typeface="+mn-ea"/>
+                <a:cs typeface="+mn-cs"/>
+              </a:rPr>
+              <a:t>How do humans classify items?</a:t>
+            </a:r>
+          </a:p>
+          <a:p>
+            <a:pPr fontAlgn="auto">
+              <a:spcAft>
+                <a:spcPts val="0"/>
+              </a:spcAft>
+              <a:buFont typeface="Arial" pitchFamily="34" charset="0"/>
+              <a:buChar char="•"/>
+              <a:defRPr/>
+            </a:pPr>
+            <a:r>
+              <a:rPr lang="en-US" dirty="0" smtClean="0">
+                <a:ea typeface="+mn-ea"/>
+                <a:cs typeface="+mn-cs"/>
+              </a:rPr>
+              <a:t>For example, suppose you had to classify the “healthiness” of a food</a:t>
+            </a:r>
+          </a:p>
+          <a:p>
+            <a:pPr lvl="1" fontAlgn="auto">
+              <a:spcAft>
+                <a:spcPts val="0"/>
+              </a:spcAft>
+              <a:buFont typeface="Arial" pitchFamily="34" charset="0"/>
+              <a:buChar char="–"/>
+              <a:defRPr/>
+            </a:pPr>
+            <a:r>
+              <a:rPr lang="en-US" dirty="0" smtClean="0">
+                <a:ea typeface="+mn-ea"/>
+              </a:rPr>
+              <a:t>Identify set of </a:t>
+            </a:r>
+            <a:r>
+              <a:rPr lang="en-US" i="1" dirty="0" smtClean="0">
+                <a:ea typeface="+mn-ea"/>
+              </a:rPr>
+              <a:t>features</a:t>
+            </a:r>
+            <a:r>
+              <a:rPr lang="en-US" dirty="0" smtClean="0">
+                <a:ea typeface="+mn-ea"/>
+              </a:rPr>
+              <a:t> indicative of health</a:t>
+            </a:r>
+          </a:p>
+          <a:p>
+            <a:pPr lvl="2" fontAlgn="auto">
+              <a:spcAft>
+                <a:spcPts val="0"/>
+              </a:spcAft>
+              <a:buFont typeface="Arial" pitchFamily="34" charset="0"/>
+              <a:buChar char="•"/>
+              <a:defRPr/>
+            </a:pPr>
+            <a:r>
+              <a:rPr lang="en-US" dirty="0" smtClean="0">
+                <a:ea typeface="+mn-ea"/>
+              </a:rPr>
+              <a:t>fat, cholesterol, sugar, sodium, etc.</a:t>
+            </a:r>
+          </a:p>
+          <a:p>
+            <a:pPr lvl="1" fontAlgn="auto">
+              <a:spcAft>
+                <a:spcPts val="0"/>
+              </a:spcAft>
+              <a:buFont typeface="Arial" pitchFamily="34" charset="0"/>
+              <a:buChar char="–"/>
+              <a:defRPr/>
+            </a:pPr>
+            <a:r>
+              <a:rPr lang="en-US" i="1" dirty="0" smtClean="0">
+                <a:ea typeface="+mn-ea"/>
+              </a:rPr>
+              <a:t>Extract</a:t>
+            </a:r>
+            <a:r>
+              <a:rPr lang="en-US" dirty="0" smtClean="0">
+                <a:ea typeface="+mn-ea"/>
+              </a:rPr>
+              <a:t> features from foods</a:t>
+            </a:r>
+          </a:p>
+          <a:p>
+            <a:pPr lvl="2" fontAlgn="auto">
+              <a:spcAft>
+                <a:spcPts val="0"/>
+              </a:spcAft>
+              <a:buFont typeface="Arial" pitchFamily="34" charset="0"/>
+              <a:buChar char="•"/>
+              <a:defRPr/>
+            </a:pPr>
+            <a:r>
+              <a:rPr lang="en-US" dirty="0" smtClean="0">
+                <a:ea typeface="+mn-ea"/>
+              </a:rPr>
+              <a:t>Read nutritional facts, chemical analysis, etc.</a:t>
+            </a:r>
+          </a:p>
+          <a:p>
+            <a:pPr lvl="1" fontAlgn="auto">
+              <a:spcAft>
+                <a:spcPts val="0"/>
+              </a:spcAft>
+              <a:buFont typeface="Arial" pitchFamily="34" charset="0"/>
+              <a:buChar char="–"/>
+              <a:defRPr/>
+            </a:pPr>
+            <a:r>
+              <a:rPr lang="en-US" i="1" dirty="0" smtClean="0">
+                <a:ea typeface="+mn-ea"/>
+              </a:rPr>
+              <a:t>Combine evidence</a:t>
+            </a:r>
+            <a:r>
+              <a:rPr lang="en-US" dirty="0" smtClean="0">
+                <a:ea typeface="+mn-ea"/>
+              </a:rPr>
+              <a:t> from the features into a hypothesis</a:t>
+            </a:r>
+          </a:p>
+          <a:p>
+            <a:pPr lvl="2" fontAlgn="auto">
+              <a:spcAft>
+                <a:spcPts val="0"/>
+              </a:spcAft>
+              <a:buFont typeface="Arial" pitchFamily="34" charset="0"/>
+              <a:buChar char="•"/>
+              <a:defRPr/>
+            </a:pPr>
+            <a:r>
+              <a:rPr lang="en-US" dirty="0" smtClean="0">
+                <a:ea typeface="+mn-ea"/>
+              </a:rPr>
+              <a:t>Add health features together to get “healthiness factor”</a:t>
+            </a:r>
+          </a:p>
+          <a:p>
+            <a:pPr lvl="1" fontAlgn="auto">
+              <a:spcAft>
+                <a:spcPts val="0"/>
+              </a:spcAft>
+              <a:buFont typeface="Arial" pitchFamily="34" charset="0"/>
+              <a:buChar char="–"/>
+              <a:defRPr/>
+            </a:pPr>
+            <a:r>
+              <a:rPr lang="en-US" dirty="0" smtClean="0">
+                <a:ea typeface="+mn-ea"/>
+              </a:rPr>
+              <a:t>Finally, </a:t>
+            </a:r>
+            <a:r>
+              <a:rPr lang="en-US" i="1" dirty="0" smtClean="0">
+                <a:ea typeface="+mn-ea"/>
+              </a:rPr>
+              <a:t>classify</a:t>
+            </a:r>
+            <a:r>
+              <a:rPr lang="en-US" dirty="0" smtClean="0">
+                <a:ea typeface="+mn-ea"/>
+              </a:rPr>
+              <a:t> the item based on the evidence</a:t>
+            </a:r>
+          </a:p>
+          <a:p>
+            <a:pPr lvl="2" fontAlgn="auto">
+              <a:spcAft>
+                <a:spcPts val="0"/>
+              </a:spcAft>
+              <a:buFont typeface="Arial" pitchFamily="34" charset="0"/>
+              <a:buChar char="•"/>
+              <a:defRPr/>
+            </a:pPr>
+            <a:r>
+              <a:rPr lang="en-US" dirty="0" smtClean="0">
+                <a:ea typeface="+mn-ea"/>
+              </a:rPr>
+              <a:t>If “healthiness factor” is above a certain value, then deem it healthy</a:t>
+            </a:r>
+          </a:p>
+        </p:txBody>
+      </p:sp>
+    </p:spTree>
+  </p:cSld>
+  <p:clrMapOvr>
+    <a:masterClrMapping/>
+  </p:clrMapOvr>
+</p:sld>
+</file>
+
+<file path=ppt/slides/slide40.xml><?xml version="1.0" encoding="utf-8"?>
 <p:sld xmlns:a="http://schemas.openxmlformats.org/drawingml/2006/main" xmlns:r="http://schemas.openxmlformats.org/officeDocument/2006/relationships" xmlns:p="http://schemas.openxmlformats.org/presentationml/2006/main">
   <p:cSld>
     <p:spTree>
@@ -21049,270 +21626,7 @@
 </p:sld>
 </file>
 
-<file path=ppt/slides/slide4.xml><?xml version="1.0" encoding="utf-8"?>
-<p:sld xmlns:a="http://schemas.openxmlformats.org/drawingml/2006/main" xmlns:r="http://schemas.openxmlformats.org/officeDocument/2006/relationships" xmlns:p="http://schemas.openxmlformats.org/presentationml/2006/main">
-  <p:cSld>
-    <p:spTree>
-      <p:nvGrpSpPr>
-        <p:cNvPr id="1" name=""/>
-        <p:cNvGrpSpPr/>
-        <p:nvPr/>
-      </p:nvGrpSpPr>
-      <p:grpSpPr>
-        <a:xfrm>
-          <a:off x="0" y="0"/>
-          <a:ext cx="0" cy="0"/>
-          <a:chOff x="0" y="0"/>
-          <a:chExt cx="0" cy="0"/>
-        </a:xfrm>
-      </p:grpSpPr>
-      <p:sp>
-        <p:nvSpPr>
-          <p:cNvPr id="16385" name="Title 1"/>
-          <p:cNvSpPr>
-            <a:spLocks noGrp="1"/>
-          </p:cNvSpPr>
-          <p:nvPr>
-            <p:ph type="title"/>
-          </p:nvPr>
-        </p:nvSpPr>
-        <p:spPr/>
-        <p:txBody>
-          <a:bodyPr/>
-          <a:lstStyle/>
-          <a:p>
-            <a:r>
-              <a:rPr lang="en-US" smtClean="0"/>
-              <a:t>How to Classify?</a:t>
-            </a:r>
-          </a:p>
-        </p:txBody>
-      </p:sp>
-      <p:sp>
-        <p:nvSpPr>
-          <p:cNvPr id="3" name="Content Placeholder 2"/>
-          <p:cNvSpPr>
-            <a:spLocks noGrp="1"/>
-          </p:cNvSpPr>
-          <p:nvPr>
-            <p:ph idx="1"/>
-          </p:nvPr>
-        </p:nvSpPr>
-        <p:spPr/>
-        <p:txBody>
-          <a:bodyPr rtlCol="0">
-            <a:normAutofit fontScale="92500" lnSpcReduction="20000"/>
-          </a:bodyPr>
-          <a:lstStyle/>
-          <a:p>
-            <a:pPr fontAlgn="auto">
-              <a:spcAft>
-                <a:spcPts val="0"/>
-              </a:spcAft>
-              <a:buFont typeface="Arial" pitchFamily="34" charset="0"/>
-              <a:buChar char="•"/>
-              <a:defRPr/>
-            </a:pPr>
-            <a:r>
-              <a:rPr lang="en-US" dirty="0" smtClean="0">
-                <a:ea typeface="+mn-ea"/>
-                <a:cs typeface="+mn-cs"/>
-              </a:rPr>
-              <a:t>How do humans classify items?</a:t>
-            </a:r>
-          </a:p>
-          <a:p>
-            <a:pPr fontAlgn="auto">
-              <a:spcAft>
-                <a:spcPts val="0"/>
-              </a:spcAft>
-              <a:buFont typeface="Arial" pitchFamily="34" charset="0"/>
-              <a:buChar char="•"/>
-              <a:defRPr/>
-            </a:pPr>
-            <a:r>
-              <a:rPr lang="en-US" dirty="0" smtClean="0">
-                <a:ea typeface="+mn-ea"/>
-                <a:cs typeface="+mn-cs"/>
-              </a:rPr>
-              <a:t>For example, suppose you had to classify the “healthiness” of a food</a:t>
-            </a:r>
-          </a:p>
-          <a:p>
-            <a:pPr lvl="1" fontAlgn="auto">
-              <a:spcAft>
-                <a:spcPts val="0"/>
-              </a:spcAft>
-              <a:buFont typeface="Arial" pitchFamily="34" charset="0"/>
-              <a:buChar char="–"/>
-              <a:defRPr/>
-            </a:pPr>
-            <a:r>
-              <a:rPr lang="en-US" dirty="0" smtClean="0">
-                <a:ea typeface="+mn-ea"/>
-              </a:rPr>
-              <a:t>Identify set of </a:t>
-            </a:r>
-            <a:r>
-              <a:rPr lang="en-US" i="1" dirty="0" smtClean="0">
-                <a:ea typeface="+mn-ea"/>
-              </a:rPr>
-              <a:t>features</a:t>
-            </a:r>
-            <a:r>
-              <a:rPr lang="en-US" dirty="0" smtClean="0">
-                <a:ea typeface="+mn-ea"/>
-              </a:rPr>
-              <a:t> indicative of health</a:t>
-            </a:r>
-          </a:p>
-          <a:p>
-            <a:pPr lvl="2" fontAlgn="auto">
-              <a:spcAft>
-                <a:spcPts val="0"/>
-              </a:spcAft>
-              <a:buFont typeface="Arial" pitchFamily="34" charset="0"/>
-              <a:buChar char="•"/>
-              <a:defRPr/>
-            </a:pPr>
-            <a:r>
-              <a:rPr lang="en-US" dirty="0" smtClean="0">
-                <a:ea typeface="+mn-ea"/>
-              </a:rPr>
-              <a:t>fat, cholesterol, sugar, sodium, etc.</a:t>
-            </a:r>
-          </a:p>
-          <a:p>
-            <a:pPr lvl="1" fontAlgn="auto">
-              <a:spcAft>
-                <a:spcPts val="0"/>
-              </a:spcAft>
-              <a:buFont typeface="Arial" pitchFamily="34" charset="0"/>
-              <a:buChar char="–"/>
-              <a:defRPr/>
-            </a:pPr>
-            <a:r>
-              <a:rPr lang="en-US" i="1" dirty="0" smtClean="0">
-                <a:ea typeface="+mn-ea"/>
-              </a:rPr>
-              <a:t>Extract</a:t>
-            </a:r>
-            <a:r>
-              <a:rPr lang="en-US" dirty="0" smtClean="0">
-                <a:ea typeface="+mn-ea"/>
-              </a:rPr>
-              <a:t> features from foods</a:t>
-            </a:r>
-          </a:p>
-          <a:p>
-            <a:pPr lvl="2" fontAlgn="auto">
-              <a:spcAft>
-                <a:spcPts val="0"/>
-              </a:spcAft>
-              <a:buFont typeface="Arial" pitchFamily="34" charset="0"/>
-              <a:buChar char="•"/>
-              <a:defRPr/>
-            </a:pPr>
-            <a:r>
-              <a:rPr lang="en-US" dirty="0" smtClean="0">
-                <a:ea typeface="+mn-ea"/>
-              </a:rPr>
-              <a:t>Read nutritional facts, chemical analysis, etc.</a:t>
-            </a:r>
-          </a:p>
-          <a:p>
-            <a:pPr lvl="1" fontAlgn="auto">
-              <a:spcAft>
-                <a:spcPts val="0"/>
-              </a:spcAft>
-              <a:buFont typeface="Arial" pitchFamily="34" charset="0"/>
-              <a:buChar char="–"/>
-              <a:defRPr/>
-            </a:pPr>
-            <a:r>
-              <a:rPr lang="en-US" i="1" dirty="0" smtClean="0">
-                <a:ea typeface="+mn-ea"/>
-              </a:rPr>
-              <a:t>Combine evidence</a:t>
-            </a:r>
-            <a:r>
-              <a:rPr lang="en-US" dirty="0" smtClean="0">
-                <a:ea typeface="+mn-ea"/>
-              </a:rPr>
-              <a:t> from the features into a hypothesis</a:t>
-            </a:r>
-          </a:p>
-          <a:p>
-            <a:pPr lvl="2" fontAlgn="auto">
-              <a:spcAft>
-                <a:spcPts val="0"/>
-              </a:spcAft>
-              <a:buFont typeface="Arial" pitchFamily="34" charset="0"/>
-              <a:buChar char="•"/>
-              <a:defRPr/>
-            </a:pPr>
-            <a:r>
-              <a:rPr lang="en-US" dirty="0" smtClean="0">
-                <a:ea typeface="+mn-ea"/>
-              </a:rPr>
-              <a:t>Add health features together to get “healthiness factor”</a:t>
-            </a:r>
-          </a:p>
-          <a:p>
-            <a:pPr lvl="1" fontAlgn="auto">
-              <a:spcAft>
-                <a:spcPts val="0"/>
-              </a:spcAft>
-              <a:buFont typeface="Arial" pitchFamily="34" charset="0"/>
-              <a:buChar char="–"/>
-              <a:defRPr/>
-            </a:pPr>
-            <a:r>
-              <a:rPr lang="en-US" dirty="0" smtClean="0">
-                <a:ea typeface="+mn-ea"/>
-              </a:rPr>
-              <a:t>Finally, </a:t>
-            </a:r>
-            <a:r>
-              <a:rPr lang="en-US" i="1" dirty="0" smtClean="0">
-                <a:ea typeface="+mn-ea"/>
-              </a:rPr>
-              <a:t>classify</a:t>
-            </a:r>
-            <a:r>
-              <a:rPr lang="en-US" dirty="0" smtClean="0">
-                <a:ea typeface="+mn-ea"/>
-              </a:rPr>
-              <a:t> the item based on the evidence</a:t>
-            </a:r>
-          </a:p>
-          <a:p>
-            <a:pPr lvl="2" fontAlgn="auto">
-              <a:spcAft>
-                <a:spcPts val="0"/>
-              </a:spcAft>
-              <a:buFont typeface="Arial" pitchFamily="34" charset="0"/>
-              <a:buChar char="•"/>
-              <a:defRPr/>
-            </a:pPr>
-            <a:r>
-              <a:rPr lang="en-US" dirty="0" smtClean="0">
-                <a:ea typeface="+mn-ea"/>
-              </a:rPr>
-              <a:t>If “healthiness factor” is above a certain value, then deem it healthy</a:t>
-            </a:r>
-          </a:p>
-        </p:txBody>
-      </p:sp>
-    </p:spTree>
-  </p:cSld>
-  <p:clrMapOvr>
-    <a:masterClrMapping/>
-  </p:clrMapOvr>
-</p:sld>
-</file>
-
-<file path=ppt/slides/slide40.xml><?xml version="1.0" encoding="utf-8"?>
+<file path=ppt/slides/slide41.xml><?xml version="1.0" encoding="utf-8"?>
 <p:sld xmlns:a="http://schemas.openxmlformats.org/drawingml/2006/main" xmlns:r="http://schemas.openxmlformats.org/officeDocument/2006/relationships" xmlns:p="http://schemas.openxmlformats.org/presentationml/2006/main">
   <p:cSld>
     <p:spTree>
@@ -21415,7 +21729,7 @@
 </p:sld>
 </file>
 
-<file path=ppt/slides/slide41.xml><?xml version="1.0" encoding="utf-8"?>
+<file path=ppt/slides/slide42.xml><?xml version="1.0" encoding="utf-8"?>
 <p:sld xmlns:a="http://schemas.openxmlformats.org/drawingml/2006/main" xmlns:r="http://schemas.openxmlformats.org/officeDocument/2006/relationships" xmlns:p="http://schemas.openxmlformats.org/presentationml/2006/main">
   <p:cSld>
     <p:spTree>
@@ -21658,7 +21972,7 @@
 </p:sld>
 </file>
 
-<file path=ppt/slides/slide42.xml><?xml version="1.0" encoding="utf-8"?>
+<file path=ppt/slides/slide43.xml><?xml version="1.0" encoding="utf-8"?>
 <p:sld xmlns:a="http://schemas.openxmlformats.org/drawingml/2006/main" xmlns:r="http://schemas.openxmlformats.org/officeDocument/2006/relationships" xmlns:p="http://schemas.openxmlformats.org/presentationml/2006/main">
   <p:cSld>
     <p:spTree>
@@ -21713,7 +22027,7 @@
           <a:graphicData uri="http://schemas.openxmlformats.org/presentationml/2006/ole">
             <mc:AlternateContent xmlns:mc="http://schemas.openxmlformats.org/markup-compatibility/2006">
               <mc:Choice xmlns:v="urn:schemas-microsoft-com:vml" Requires="v">
-                <p:oleObj spid="_x0000_s2079" name="Acrobat Document" r:id="rId3" imgW="5118100" imgH="6146800" progId="">
+                <p:oleObj spid="_x0000_s2080" name="Acrobat Document" r:id="rId3" imgW="5118100" imgH="6146800" progId="">
                   <p:embed/>
                 </p:oleObj>
               </mc:Choice>
@@ -21800,7 +22114,7 @@
 </p:sld>
 </file>
 
-<file path=ppt/slides/slide43.xml><?xml version="1.0" encoding="utf-8"?>
+<file path=ppt/slides/slide44.xml><?xml version="1.0" encoding="utf-8"?>
 <p:sld xmlns:a="http://schemas.openxmlformats.org/drawingml/2006/main" xmlns:r="http://schemas.openxmlformats.org/officeDocument/2006/relationships" xmlns:p="http://schemas.openxmlformats.org/presentationml/2006/main">
   <p:cSld>
     <p:spTree>
@@ -21980,7 +22294,7 @@
 </p:sld>
 </file>
 
-<file path=ppt/slides/slide44.xml><?xml version="1.0" encoding="utf-8"?>
+<file path=ppt/slides/slide45.xml><?xml version="1.0" encoding="utf-8"?>
 <p:sld xmlns:a="http://schemas.openxmlformats.org/drawingml/2006/main" xmlns:r="http://schemas.openxmlformats.org/officeDocument/2006/relationships" xmlns:p="http://schemas.openxmlformats.org/presentationml/2006/main">
   <p:cSld>
     <p:spTree>
@@ -22035,7 +22349,7 @@
           <a:graphicData uri="http://schemas.openxmlformats.org/presentationml/2006/ole">
             <mc:AlternateContent xmlns:mc="http://schemas.openxmlformats.org/markup-compatibility/2006">
               <mc:Choice xmlns:v="urn:schemas-microsoft-com:vml" Requires="v">
-                <p:oleObj spid="_x0000_s1055" name="Acrobat Document" r:id="rId3" imgW="4775200" imgH="3314700" progId="">
+                <p:oleObj spid="_x0000_s1056" name="Acrobat Document" r:id="rId3" imgW="4775200" imgH="3314700" progId="">
                   <p:embed/>
                 </p:oleObj>
               </mc:Choice>
@@ -22122,7 +22436,7 @@
 </p:sld>
 </file>
 
-<file path=ppt/slides/slide45.xml><?xml version="1.0" encoding="utf-8"?>
+<file path=ppt/slides/slide46.xml><?xml version="1.0" encoding="utf-8"?>
 <p:sld xmlns:a="http://schemas.openxmlformats.org/drawingml/2006/main" xmlns:r="http://schemas.openxmlformats.org/officeDocument/2006/relationships" xmlns:p="http://schemas.openxmlformats.org/presentationml/2006/main">
   <p:cSld>
     <p:spTree>
@@ -22318,7 +22632,7 @@
 </p:sld>
 </file>
 
-<file path=ppt/slides/slide46.xml><?xml version="1.0" encoding="utf-8"?>
+<file path=ppt/slides/slide47.xml><?xml version="1.0" encoding="utf-8"?>
 <p:sld xmlns:a="http://schemas.openxmlformats.org/drawingml/2006/main" xmlns:r="http://schemas.openxmlformats.org/officeDocument/2006/relationships" xmlns:p="http://schemas.openxmlformats.org/presentationml/2006/main">
   <p:cSld>
     <p:spTree>
@@ -22517,7 +22831,7 @@
 </p:sld>
 </file>
 
-<file path=ppt/slides/slide47.xml><?xml version="1.0" encoding="utf-8"?>
+<file path=ppt/slides/slide48.xml><?xml version="1.0" encoding="utf-8"?>
 <p:sld xmlns:a="http://schemas.openxmlformats.org/drawingml/2006/main" xmlns:r="http://schemas.openxmlformats.org/officeDocument/2006/relationships" xmlns:p="http://schemas.openxmlformats.org/presentationml/2006/main">
   <p:cSld>
     <p:spTree>
@@ -22572,7 +22886,7 @@
           <a:graphicData uri="http://schemas.openxmlformats.org/presentationml/2006/ole">
             <mc:AlternateContent xmlns:mc="http://schemas.openxmlformats.org/markup-compatibility/2006">
               <mc:Choice xmlns:v="urn:schemas-microsoft-com:vml" Requires="v">
-                <p:oleObj spid="_x0000_s3103" name="Acrobat Document" r:id="rId3" imgW="3695700" imgH="4445000" progId="">
+                <p:oleObj spid="_x0000_s3104" name="Acrobat Document" r:id="rId3" imgW="3695700" imgH="4445000" progId="">
                   <p:embed/>
                 </p:oleObj>
               </mc:Choice>
@@ -22659,7 +22973,7 @@
 </p:sld>
 </file>
 
-<file path=ppt/slides/slide48.xml><?xml version="1.0" encoding="utf-8"?>
+<file path=ppt/slides/slide49.xml><?xml version="1.0" encoding="utf-8"?>
 <p:sld xmlns:a="http://schemas.openxmlformats.org/drawingml/2006/main" xmlns:r="http://schemas.openxmlformats.org/officeDocument/2006/relationships" xmlns:p="http://schemas.openxmlformats.org/presentationml/2006/main">
   <p:cSld>
     <p:spTree>
@@ -22780,277 +23094,6 @@
                 <a:cs typeface="+mn-cs"/>
               </a:rPr>
               <a:t>We can bridge the semantic gap by classifying ads and queries according to a semantic hierarchy</a:t>
-            </a:r>
-          </a:p>
-        </p:txBody>
-      </p:sp>
-    </p:spTree>
-  </p:cSld>
-  <p:clrMapOvr>
-    <a:masterClrMapping/>
-  </p:clrMapOvr>
-</p:sld>
-</file>
-
-<file path=ppt/slides/slide49.xml><?xml version="1.0" encoding="utf-8"?>
-<p:sld xmlns:a="http://schemas.openxmlformats.org/drawingml/2006/main" xmlns:r="http://schemas.openxmlformats.org/officeDocument/2006/relationships" xmlns:p="http://schemas.openxmlformats.org/presentationml/2006/main">
-  <p:cSld>
-    <p:spTree>
-      <p:nvGrpSpPr>
-        <p:cNvPr id="1" name=""/>
-        <p:cNvGrpSpPr/>
-        <p:nvPr/>
-      </p:nvGrpSpPr>
-      <p:grpSpPr>
-        <a:xfrm>
-          <a:off x="0" y="0"/>
-          <a:ext cx="0" cy="0"/>
-          <a:chOff x="0" y="0"/>
-          <a:chExt cx="0" cy="0"/>
-        </a:xfrm>
-      </p:grpSpPr>
-      <p:sp>
-        <p:nvSpPr>
-          <p:cNvPr id="58369" name="Title 1"/>
-          <p:cNvSpPr>
-            <a:spLocks noGrp="1"/>
-          </p:cNvSpPr>
-          <p:nvPr>
-            <p:ph type="title"/>
-          </p:nvPr>
-        </p:nvSpPr>
-        <p:spPr/>
-        <p:txBody>
-          <a:bodyPr/>
-          <a:lstStyle/>
-          <a:p>
-            <a:r>
-              <a:rPr lang="en-US" smtClean="0"/>
-              <a:t>Semantic Classification</a:t>
-            </a:r>
-          </a:p>
-        </p:txBody>
-      </p:sp>
-      <p:sp>
-        <p:nvSpPr>
-          <p:cNvPr id="3" name="Content Placeholder 2"/>
-          <p:cNvSpPr>
-            <a:spLocks noGrp="1"/>
-          </p:cNvSpPr>
-          <p:nvPr>
-            <p:ph idx="1"/>
-          </p:nvPr>
-        </p:nvSpPr>
-        <p:spPr/>
-        <p:txBody>
-          <a:bodyPr rtlCol="0">
-            <a:normAutofit lnSpcReduction="10000"/>
-          </a:bodyPr>
-          <a:lstStyle/>
-          <a:p>
-            <a:pPr fontAlgn="auto">
-              <a:spcAft>
-                <a:spcPts val="0"/>
-              </a:spcAft>
-              <a:buFont typeface="Arial" pitchFamily="34" charset="0"/>
-              <a:buChar char="•"/>
-              <a:defRPr/>
-            </a:pPr>
-            <a:r>
-              <a:rPr lang="en-US" dirty="0" smtClean="0">
-                <a:ea typeface="+mn-ea"/>
-                <a:cs typeface="+mn-cs"/>
-              </a:rPr>
-              <a:t>Semantic hierarchy ontology</a:t>
-            </a:r>
-          </a:p>
-          <a:p>
-            <a:pPr lvl="1" fontAlgn="auto">
-              <a:spcAft>
-                <a:spcPts val="0"/>
-              </a:spcAft>
-              <a:buFont typeface="Arial" pitchFamily="34" charset="0"/>
-              <a:buChar char="–"/>
-              <a:defRPr/>
-            </a:pPr>
-            <a:r>
-              <a:rPr lang="en-US" dirty="0" smtClean="0">
-                <a:ea typeface="+mn-ea"/>
-              </a:rPr>
-              <a:t>Example: Pets / Aquariums / Supplies</a:t>
-            </a:r>
-          </a:p>
-          <a:p>
-            <a:pPr fontAlgn="auto">
-              <a:spcAft>
-                <a:spcPts val="0"/>
-              </a:spcAft>
-              <a:buFont typeface="Arial" pitchFamily="34" charset="0"/>
-              <a:buChar char="•"/>
-              <a:defRPr/>
-            </a:pPr>
-            <a:r>
-              <a:rPr lang="en-US" dirty="0" smtClean="0">
-                <a:ea typeface="+mn-ea"/>
-                <a:cs typeface="+mn-cs"/>
-              </a:rPr>
-              <a:t>Training data</a:t>
-            </a:r>
-          </a:p>
-          <a:p>
-            <a:pPr lvl="1" fontAlgn="auto">
-              <a:spcAft>
-                <a:spcPts val="0"/>
-              </a:spcAft>
-              <a:buFont typeface="Arial" pitchFamily="34" charset="0"/>
-              <a:buChar char="–"/>
-              <a:defRPr/>
-            </a:pPr>
-            <a:r>
-              <a:rPr lang="en-US" dirty="0" smtClean="0">
-                <a:ea typeface="+mn-ea"/>
-              </a:rPr>
-              <a:t>Large number of queries and ads are manually classified into the hierarchy</a:t>
-            </a:r>
-          </a:p>
-          <a:p>
-            <a:pPr fontAlgn="auto">
-              <a:spcAft>
-                <a:spcPts val="0"/>
-              </a:spcAft>
-              <a:buFont typeface="Arial" pitchFamily="34" charset="0"/>
-              <a:buChar char="•"/>
-              <a:defRPr/>
-            </a:pPr>
-            <a:r>
-              <a:rPr lang="en-US" dirty="0" smtClean="0">
-                <a:ea typeface="+mn-ea"/>
-                <a:cs typeface="+mn-cs"/>
-              </a:rPr>
-              <a:t>Nearest neighbor classification has been shown to be effective for this task</a:t>
-            </a:r>
-          </a:p>
-          <a:p>
-            <a:pPr fontAlgn="auto">
-              <a:spcAft>
-                <a:spcPts val="0"/>
-              </a:spcAft>
-              <a:buFont typeface="Arial" pitchFamily="34" charset="0"/>
-              <a:buChar char="•"/>
-              <a:defRPr/>
-            </a:pPr>
-            <a:r>
-              <a:rPr lang="en-US" dirty="0" smtClean="0">
-                <a:ea typeface="+mn-ea"/>
-                <a:cs typeface="+mn-cs"/>
-              </a:rPr>
-              <a:t>Hierarchical structure of classes can be used to improve classification accuracy</a:t>
-            </a:r>
-            <a:endParaRPr lang="en-US" dirty="0">
-              <a:ea typeface="+mn-ea"/>
-              <a:cs typeface="+mn-cs"/>
-            </a:endParaRPr>
-          </a:p>
-        </p:txBody>
-      </p:sp>
-      <p:sp>
-        <p:nvSpPr>
-          <p:cNvPr id="58371" name="Text Box 4"/>
-          <p:cNvSpPr txBox="1">
-            <a:spLocks noChangeArrowheads="1"/>
-          </p:cNvSpPr>
-          <p:nvPr/>
-        </p:nvSpPr>
-        <p:spPr bwMode="auto">
-          <a:xfrm>
-            <a:off x="5943600" y="1600200"/>
-            <a:ext cx="2693988" cy="517525"/>
-          </a:xfrm>
-          <a:prstGeom prst="rect">
-            <a:avLst/>
-          </a:prstGeom>
-          <a:solidFill>
-            <a:srgbClr val="00FFFF"/>
-          </a:solidFill>
-          <a:ln w="9525">
-            <a:noFill/>
-            <a:miter lim="800000"/>
-            <a:headEnd/>
-            <a:tailEnd/>
-          </a:ln>
-        </p:spPr>
-        <p:txBody>
-          <a:bodyPr wrap="none">
-            <a:prstTxWarp prst="textNoShape">
-              <a:avLst/>
-            </a:prstTxWarp>
-            <a:spAutoFit/>
-          </a:bodyPr>
-          <a:lstStyle/>
-          <a:p>
-            <a:r>
-              <a:rPr lang="en-US" sz="1400"/>
-              <a:t>hierarchy manually constructed!</a:t>
-            </a:r>
-          </a:p>
-          <a:p>
-            <a:r>
-              <a:rPr lang="en-US" sz="1400"/>
-              <a:t>6000+ classes</a:t>
-            </a:r>
-          </a:p>
-        </p:txBody>
-      </p:sp>
-      <p:sp>
-        <p:nvSpPr>
-          <p:cNvPr id="58372" name="Text Box 4"/>
-          <p:cNvSpPr txBox="1">
-            <a:spLocks noChangeArrowheads="1"/>
-          </p:cNvSpPr>
-          <p:nvPr/>
-        </p:nvSpPr>
-        <p:spPr bwMode="auto">
-          <a:xfrm>
-            <a:off x="1485900" y="5943600"/>
-            <a:ext cx="5753100" cy="730250"/>
-          </a:xfrm>
-          <a:prstGeom prst="rect">
-            <a:avLst/>
-          </a:prstGeom>
-          <a:solidFill>
-            <a:srgbClr val="00FFFF"/>
-          </a:solidFill>
-          <a:ln w="9525">
-            <a:noFill/>
-            <a:miter lim="800000"/>
-            <a:headEnd/>
-            <a:tailEnd/>
-          </a:ln>
-        </p:spPr>
-        <p:txBody>
-          <a:bodyPr wrap="none">
-            <a:prstTxWarp prst="textNoShape">
-              <a:avLst/>
-            </a:prstTxWarp>
-            <a:spAutoFit/>
-          </a:bodyPr>
-          <a:lstStyle/>
-          <a:p>
-            <a:r>
-              <a:rPr lang="en-US" sz="1400"/>
-              <a:t>Broder et al. 2007: SVM on 6000+ classes can be slow to run.</a:t>
-            </a:r>
-          </a:p>
-          <a:p>
-            <a:r>
-              <a:rPr lang="en-US" sz="1400"/>
-              <a:t>Alternative: define query as either query or doc to be classified, and </a:t>
-            </a:r>
-          </a:p>
-          <a:p>
-            <a:r>
-              <a:rPr lang="en-US" sz="1400"/>
-              <a:t>corpus as 6000+ classes, and use conventional cosine &amp; TFIDF as NN</a:t>
             </a:r>
           </a:p>
         </p:txBody>
@@ -23182,6 +23225,277 @@
           <a:chExt cx="0" cy="0"/>
         </a:xfrm>
       </p:grpSpPr>
+      <p:sp>
+        <p:nvSpPr>
+          <p:cNvPr id="58369" name="Title 1"/>
+          <p:cNvSpPr>
+            <a:spLocks noGrp="1"/>
+          </p:cNvSpPr>
+          <p:nvPr>
+            <p:ph type="title"/>
+          </p:nvPr>
+        </p:nvSpPr>
+        <p:spPr/>
+        <p:txBody>
+          <a:bodyPr/>
+          <a:lstStyle/>
+          <a:p>
+            <a:r>
+              <a:rPr lang="en-US" smtClean="0"/>
+              <a:t>Semantic Classification</a:t>
+            </a:r>
+          </a:p>
+        </p:txBody>
+      </p:sp>
+      <p:sp>
+        <p:nvSpPr>
+          <p:cNvPr id="3" name="Content Placeholder 2"/>
+          <p:cNvSpPr>
+            <a:spLocks noGrp="1"/>
+          </p:cNvSpPr>
+          <p:nvPr>
+            <p:ph idx="1"/>
+          </p:nvPr>
+        </p:nvSpPr>
+        <p:spPr/>
+        <p:txBody>
+          <a:bodyPr rtlCol="0">
+            <a:normAutofit lnSpcReduction="10000"/>
+          </a:bodyPr>
+          <a:lstStyle/>
+          <a:p>
+            <a:pPr fontAlgn="auto">
+              <a:spcAft>
+                <a:spcPts val="0"/>
+              </a:spcAft>
+              <a:buFont typeface="Arial" pitchFamily="34" charset="0"/>
+              <a:buChar char="•"/>
+              <a:defRPr/>
+            </a:pPr>
+            <a:r>
+              <a:rPr lang="en-US" dirty="0" smtClean="0">
+                <a:ea typeface="+mn-ea"/>
+                <a:cs typeface="+mn-cs"/>
+              </a:rPr>
+              <a:t>Semantic hierarchy ontology</a:t>
+            </a:r>
+          </a:p>
+          <a:p>
+            <a:pPr lvl="1" fontAlgn="auto">
+              <a:spcAft>
+                <a:spcPts val="0"/>
+              </a:spcAft>
+              <a:buFont typeface="Arial" pitchFamily="34" charset="0"/>
+              <a:buChar char="–"/>
+              <a:defRPr/>
+            </a:pPr>
+            <a:r>
+              <a:rPr lang="en-US" dirty="0" smtClean="0">
+                <a:ea typeface="+mn-ea"/>
+              </a:rPr>
+              <a:t>Example: Pets / Aquariums / Supplies</a:t>
+            </a:r>
+          </a:p>
+          <a:p>
+            <a:pPr fontAlgn="auto">
+              <a:spcAft>
+                <a:spcPts val="0"/>
+              </a:spcAft>
+              <a:buFont typeface="Arial" pitchFamily="34" charset="0"/>
+              <a:buChar char="•"/>
+              <a:defRPr/>
+            </a:pPr>
+            <a:r>
+              <a:rPr lang="en-US" dirty="0" smtClean="0">
+                <a:ea typeface="+mn-ea"/>
+                <a:cs typeface="+mn-cs"/>
+              </a:rPr>
+              <a:t>Training data</a:t>
+            </a:r>
+          </a:p>
+          <a:p>
+            <a:pPr lvl="1" fontAlgn="auto">
+              <a:spcAft>
+                <a:spcPts val="0"/>
+              </a:spcAft>
+              <a:buFont typeface="Arial" pitchFamily="34" charset="0"/>
+              <a:buChar char="–"/>
+              <a:defRPr/>
+            </a:pPr>
+            <a:r>
+              <a:rPr lang="en-US" dirty="0" smtClean="0">
+                <a:ea typeface="+mn-ea"/>
+              </a:rPr>
+              <a:t>Large number of queries and ads are manually classified into the hierarchy</a:t>
+            </a:r>
+          </a:p>
+          <a:p>
+            <a:pPr fontAlgn="auto">
+              <a:spcAft>
+                <a:spcPts val="0"/>
+              </a:spcAft>
+              <a:buFont typeface="Arial" pitchFamily="34" charset="0"/>
+              <a:buChar char="•"/>
+              <a:defRPr/>
+            </a:pPr>
+            <a:r>
+              <a:rPr lang="en-US" dirty="0" smtClean="0">
+                <a:ea typeface="+mn-ea"/>
+                <a:cs typeface="+mn-cs"/>
+              </a:rPr>
+              <a:t>Nearest neighbor classification has been shown to be effective for this task</a:t>
+            </a:r>
+          </a:p>
+          <a:p>
+            <a:pPr fontAlgn="auto">
+              <a:spcAft>
+                <a:spcPts val="0"/>
+              </a:spcAft>
+              <a:buFont typeface="Arial" pitchFamily="34" charset="0"/>
+              <a:buChar char="•"/>
+              <a:defRPr/>
+            </a:pPr>
+            <a:r>
+              <a:rPr lang="en-US" dirty="0" smtClean="0">
+                <a:ea typeface="+mn-ea"/>
+                <a:cs typeface="+mn-cs"/>
+              </a:rPr>
+              <a:t>Hierarchical structure of classes can be used to improve classification accuracy</a:t>
+            </a:r>
+            <a:endParaRPr lang="en-US" dirty="0">
+              <a:ea typeface="+mn-ea"/>
+              <a:cs typeface="+mn-cs"/>
+            </a:endParaRPr>
+          </a:p>
+        </p:txBody>
+      </p:sp>
+      <p:sp>
+        <p:nvSpPr>
+          <p:cNvPr id="58371" name="Text Box 4"/>
+          <p:cNvSpPr txBox="1">
+            <a:spLocks noChangeArrowheads="1"/>
+          </p:cNvSpPr>
+          <p:nvPr/>
+        </p:nvSpPr>
+        <p:spPr bwMode="auto">
+          <a:xfrm>
+            <a:off x="5943600" y="1600200"/>
+            <a:ext cx="2693988" cy="517525"/>
+          </a:xfrm>
+          <a:prstGeom prst="rect">
+            <a:avLst/>
+          </a:prstGeom>
+          <a:solidFill>
+            <a:srgbClr val="00FFFF"/>
+          </a:solidFill>
+          <a:ln w="9525">
+            <a:noFill/>
+            <a:miter lim="800000"/>
+            <a:headEnd/>
+            <a:tailEnd/>
+          </a:ln>
+        </p:spPr>
+        <p:txBody>
+          <a:bodyPr wrap="none">
+            <a:prstTxWarp prst="textNoShape">
+              <a:avLst/>
+            </a:prstTxWarp>
+            <a:spAutoFit/>
+          </a:bodyPr>
+          <a:lstStyle/>
+          <a:p>
+            <a:r>
+              <a:rPr lang="en-US" sz="1400"/>
+              <a:t>hierarchy manually constructed!</a:t>
+            </a:r>
+          </a:p>
+          <a:p>
+            <a:r>
+              <a:rPr lang="en-US" sz="1400"/>
+              <a:t>6000+ classes</a:t>
+            </a:r>
+          </a:p>
+        </p:txBody>
+      </p:sp>
+      <p:sp>
+        <p:nvSpPr>
+          <p:cNvPr id="58372" name="Text Box 4"/>
+          <p:cNvSpPr txBox="1">
+            <a:spLocks noChangeArrowheads="1"/>
+          </p:cNvSpPr>
+          <p:nvPr/>
+        </p:nvSpPr>
+        <p:spPr bwMode="auto">
+          <a:xfrm>
+            <a:off x="1485900" y="5943600"/>
+            <a:ext cx="5753100" cy="730250"/>
+          </a:xfrm>
+          <a:prstGeom prst="rect">
+            <a:avLst/>
+          </a:prstGeom>
+          <a:solidFill>
+            <a:srgbClr val="00FFFF"/>
+          </a:solidFill>
+          <a:ln w="9525">
+            <a:noFill/>
+            <a:miter lim="800000"/>
+            <a:headEnd/>
+            <a:tailEnd/>
+          </a:ln>
+        </p:spPr>
+        <p:txBody>
+          <a:bodyPr wrap="none">
+            <a:prstTxWarp prst="textNoShape">
+              <a:avLst/>
+            </a:prstTxWarp>
+            <a:spAutoFit/>
+          </a:bodyPr>
+          <a:lstStyle/>
+          <a:p>
+            <a:r>
+              <a:rPr lang="en-US" sz="1400"/>
+              <a:t>Broder et al. 2007: SVM on 6000+ classes can be slow to run.</a:t>
+            </a:r>
+          </a:p>
+          <a:p>
+            <a:r>
+              <a:rPr lang="en-US" sz="1400"/>
+              <a:t>Alternative: define query as either query or doc to be classified, and </a:t>
+            </a:r>
+          </a:p>
+          <a:p>
+            <a:r>
+              <a:rPr lang="en-US" sz="1400"/>
+              <a:t>corpus as 6000+ classes, and use conventional cosine &amp; TFIDF as NN</a:t>
+            </a:r>
+          </a:p>
+        </p:txBody>
+      </p:sp>
+    </p:spTree>
+  </p:cSld>
+  <p:clrMapOvr>
+    <a:masterClrMapping/>
+  </p:clrMapOvr>
+</p:sld>
+</file>
+
+<file path=ppt/slides/slide51.xml><?xml version="1.0" encoding="utf-8"?>
+<p:sld xmlns:a="http://schemas.openxmlformats.org/drawingml/2006/main" xmlns:r="http://schemas.openxmlformats.org/officeDocument/2006/relationships" xmlns:p="http://schemas.openxmlformats.org/presentationml/2006/main">
+  <p:cSld>
+    <p:spTree>
+      <p:nvGrpSpPr>
+        <p:cNvPr id="1" name=""/>
+        <p:cNvGrpSpPr/>
+        <p:nvPr/>
+      </p:nvGrpSpPr>
+      <p:grpSpPr>
+        <a:xfrm>
+          <a:off x="0" y="0"/>
+          <a:ext cx="0" cy="0"/>
+          <a:chOff x="0" y="0"/>
+          <a:chExt cx="0" cy="0"/>
+        </a:xfrm>
+      </p:grpSpPr>
       <p:grpSp>
         <p:nvGrpSpPr>
           <p:cNvPr id="59393" name="Group 16"/>
@@ -24096,7 +24410,7 @@
 </p:sld>
 </file>
 
-<file path=ppt/slides/slide51.xml><?xml version="1.0" encoding="utf-8"?>
+<file path=ppt/slides/slide52.xml><?xml version="1.0" encoding="utf-8"?>
 <p:sld xmlns:a="http://schemas.openxmlformats.org/drawingml/2006/main" xmlns:r="http://schemas.openxmlformats.org/officeDocument/2006/relationships" xmlns:p="http://schemas.openxmlformats.org/presentationml/2006/main">
   <p:cSld>
     <p:spTree>
@@ -24265,7 +24579,7 @@
 </p:sld>
 </file>
 
-<file path=ppt/slides/slide52.xml><?xml version="1.0" encoding="utf-8"?>
+<file path=ppt/slides/slide53.xml><?xml version="1.0" encoding="utf-8"?>
 <p:sld xmlns:a="http://schemas.openxmlformats.org/drawingml/2006/main" xmlns:r="http://schemas.openxmlformats.org/officeDocument/2006/relationships" xmlns:p="http://schemas.openxmlformats.org/presentationml/2006/main">
   <p:cSld>
     <p:spTree>
@@ -24477,7 +24791,7 @@
 </p:sld>
 </file>
 
-<file path=ppt/slides/slide53.xml><?xml version="1.0" encoding="utf-8"?>
+<file path=ppt/slides/slide54.xml><?xml version="1.0" encoding="utf-8"?>
 <p:sld xmlns:a="http://schemas.openxmlformats.org/drawingml/2006/main" xmlns:r="http://schemas.openxmlformats.org/officeDocument/2006/relationships" xmlns:p="http://schemas.openxmlformats.org/presentationml/2006/main">
   <p:cSld>
     <p:spTree>
@@ -24656,7 +24970,7 @@
 </p:sld>
 </file>
 
-<file path=ppt/slides/slide54.xml><?xml version="1.0" encoding="utf-8"?>
+<file path=ppt/slides/slide55.xml><?xml version="1.0" encoding="utf-8"?>
 <p:sld xmlns:a="http://schemas.openxmlformats.org/drawingml/2006/main" xmlns:r="http://schemas.openxmlformats.org/officeDocument/2006/relationships" xmlns:p="http://schemas.openxmlformats.org/presentationml/2006/main">
   <p:cSld>
     <p:spTree>
@@ -24870,7 +25184,7 @@
 </p:sld>
 </file>
 
-<file path=ppt/slides/slide55.xml><?xml version="1.0" encoding="utf-8"?>
+<file path=ppt/slides/slide56.xml><?xml version="1.0" encoding="utf-8"?>
 <p:sld xmlns:a="http://schemas.openxmlformats.org/drawingml/2006/main" xmlns:r="http://schemas.openxmlformats.org/officeDocument/2006/relationships" xmlns:p="http://schemas.openxmlformats.org/presentationml/2006/main">
   <p:cSld>
     <p:spTree>
@@ -26058,7 +26372,7 @@
 </p:sld>
 </file>
 
-<file path=ppt/slides/slide56.xml><?xml version="1.0" encoding="utf-8"?>
+<file path=ppt/slides/slide57.xml><?xml version="1.0" encoding="utf-8"?>
 <p:sld xmlns:a="http://schemas.openxmlformats.org/drawingml/2006/main" xmlns:r="http://schemas.openxmlformats.org/officeDocument/2006/relationships" xmlns:p="http://schemas.openxmlformats.org/presentationml/2006/main">
   <p:cSld>
     <p:spTree>
@@ -26341,7 +26655,7 @@
 </p:sld>
 </file>
 
-<file path=ppt/slides/slide57.xml><?xml version="1.0" encoding="utf-8"?>
+<file path=ppt/slides/slide58.xml><?xml version="1.0" encoding="utf-8"?>
 <p:sld xmlns:a="http://schemas.openxmlformats.org/drawingml/2006/main" xmlns:r="http://schemas.openxmlformats.org/officeDocument/2006/relationships" xmlns:p="http://schemas.openxmlformats.org/presentationml/2006/main">
   <p:cSld>
     <p:spTree>
@@ -28460,7 +28774,7 @@
 </p:sld>
 </file>
 
-<file path=ppt/slides/slide58.xml><?xml version="1.0" encoding="utf-8"?>
+<file path=ppt/slides/slide59.xml><?xml version="1.0" encoding="utf-8"?>
 <p:sld xmlns:a="http://schemas.openxmlformats.org/drawingml/2006/main" xmlns:r="http://schemas.openxmlformats.org/officeDocument/2006/relationships" xmlns:p="http://schemas.openxmlformats.org/presentationml/2006/main">
   <p:cSld>
     <p:spTree>
@@ -31126,7 +31440,152 @@
 </p:sld>
 </file>
 
-<file path=ppt/slides/slide59.xml><?xml version="1.0" encoding="utf-8"?>
+<file path=ppt/slides/slide6.xml><?xml version="1.0" encoding="utf-8"?>
+<p:sld xmlns:a="http://schemas.openxmlformats.org/drawingml/2006/main" xmlns:r="http://schemas.openxmlformats.org/officeDocument/2006/relationships" xmlns:p="http://schemas.openxmlformats.org/presentationml/2006/main">
+  <p:cSld>
+    <p:spTree>
+      <p:nvGrpSpPr>
+        <p:cNvPr id="1" name=""/>
+        <p:cNvGrpSpPr/>
+        <p:nvPr/>
+      </p:nvGrpSpPr>
+      <p:grpSpPr>
+        <a:xfrm>
+          <a:off x="0" y="0"/>
+          <a:ext cx="0" cy="0"/>
+          <a:chOff x="0" y="0"/>
+          <a:chExt cx="0" cy="0"/>
+        </a:xfrm>
+      </p:grpSpPr>
+      <p:sp>
+        <p:nvSpPr>
+          <p:cNvPr id="18433" name="Title 1"/>
+          <p:cNvSpPr>
+            <a:spLocks noGrp="1"/>
+          </p:cNvSpPr>
+          <p:nvPr>
+            <p:ph type="title"/>
+          </p:nvPr>
+        </p:nvSpPr>
+        <p:spPr/>
+        <p:txBody>
+          <a:bodyPr/>
+          <a:lstStyle/>
+          <a:p>
+            <a:r>
+              <a:rPr lang="en-US" smtClean="0"/>
+              <a:t>Naïve Bayes Classifier</a:t>
+            </a:r>
+          </a:p>
+        </p:txBody>
+      </p:sp>
+      <p:sp>
+        <p:nvSpPr>
+          <p:cNvPr id="18434" name="Content Placeholder 5"/>
+          <p:cNvSpPr>
+            <a:spLocks noGrp="1"/>
+          </p:cNvSpPr>
+          <p:nvPr>
+            <p:ph idx="1"/>
+          </p:nvPr>
+        </p:nvSpPr>
+        <p:spPr/>
+        <p:txBody>
+          <a:bodyPr/>
+          <a:lstStyle/>
+          <a:p>
+            <a:r>
+              <a:rPr lang="en-US" smtClean="0"/>
+              <a:t>Probabilistic classifier based on Bayes’ rule:</a:t>
+            </a:r>
+          </a:p>
+          <a:p>
+            <a:endParaRPr lang="en-US" smtClean="0"/>
+          </a:p>
+          <a:p>
+            <a:endParaRPr lang="en-US" smtClean="0"/>
+          </a:p>
+          <a:p>
+            <a:endParaRPr lang="en-US" smtClean="0"/>
+          </a:p>
+          <a:p>
+            <a:r>
+              <a:rPr lang="en-US" i="1" smtClean="0"/>
+              <a:t>C</a:t>
+            </a:r>
+            <a:r>
+              <a:rPr lang="en-US" smtClean="0"/>
+              <a:t> is a random variable corresponding to the class</a:t>
+            </a:r>
+          </a:p>
+          <a:p>
+            <a:r>
+              <a:rPr lang="en-US" i="1" smtClean="0"/>
+              <a:t>D</a:t>
+            </a:r>
+            <a:r>
+              <a:rPr lang="en-US" smtClean="0"/>
+              <a:t> is a random variable corresponding to the input (e.g. document)</a:t>
+            </a:r>
+          </a:p>
+        </p:txBody>
+      </p:sp>
+      <p:pic>
+        <p:nvPicPr>
+          <p:cNvPr id="18435" name="Content Placeholder 4" descr="TP_tmp.png"/>
+          <p:cNvPicPr>
+            <a:picLocks noChangeAspect="1"/>
+          </p:cNvPicPr>
+          <p:nvPr>
+            <p:custDataLst>
+              <p:tags r:id="rId1"/>
+            </p:custDataLst>
+          </p:nvPr>
+        </p:nvPicPr>
+        <p:blipFill>
+          <a:blip r:embed="rId3">
+            <a:clrChange>
+              <a:clrFrom>
+                <a:srgbClr val="FFFFFF"/>
+              </a:clrFrom>
+              <a:clrTo>
+                <a:srgbClr val="FFFFFF">
+                  <a:alpha val="0"/>
+                </a:srgbClr>
+              </a:clrTo>
+            </a:clrChange>
+          </a:blip>
+          <a:srcRect/>
+          <a:stretch>
+            <a:fillRect/>
+          </a:stretch>
+        </p:blipFill>
+        <p:spPr bwMode="auto">
+          <a:xfrm>
+            <a:off x="1981200" y="2387600"/>
+            <a:ext cx="4673600" cy="1346200"/>
+          </a:xfrm>
+          <a:prstGeom prst="rect">
+            <a:avLst/>
+          </a:prstGeom>
+          <a:noFill/>
+          <a:ln w="9525">
+            <a:noFill/>
+            <a:miter lim="800000"/>
+            <a:headEnd/>
+            <a:tailEnd/>
+          </a:ln>
+        </p:spPr>
+      </p:pic>
+    </p:spTree>
+  </p:cSld>
+  <p:clrMapOvr>
+    <a:masterClrMapping/>
+  </p:clrMapOvr>
+</p:sld>
+</file>
+
+<file path=ppt/slides/slide60.xml><?xml version="1.0" encoding="utf-8"?>
 <p:sld xmlns:a="http://schemas.openxmlformats.org/drawingml/2006/main" xmlns:r="http://schemas.openxmlformats.org/officeDocument/2006/relationships" xmlns:p="http://schemas.openxmlformats.org/presentationml/2006/main">
   <p:cSld>
     <p:spTree>
@@ -31584,152 +32043,7 @@
 </p:sld>
 </file>
 
-<file path=ppt/slides/slide6.xml><?xml version="1.0" encoding="utf-8"?>
-<p:sld xmlns:a="http://schemas.openxmlformats.org/drawingml/2006/main" xmlns:r="http://schemas.openxmlformats.org/officeDocument/2006/relationships" xmlns:p="http://schemas.openxmlformats.org/presentationml/2006/main">
-  <p:cSld>
-    <p:spTree>
-      <p:nvGrpSpPr>
-        <p:cNvPr id="1" name=""/>
-        <p:cNvGrpSpPr/>
-        <p:nvPr/>
-      </p:nvGrpSpPr>
-      <p:grpSpPr>
-        <a:xfrm>
-          <a:off x="0" y="0"/>
-          <a:ext cx="0" cy="0"/>
-          <a:chOff x="0" y="0"/>
-          <a:chExt cx="0" cy="0"/>
-        </a:xfrm>
-      </p:grpSpPr>
-      <p:sp>
-        <p:nvSpPr>
-          <p:cNvPr id="18433" name="Title 1"/>
-          <p:cNvSpPr>
-            <a:spLocks noGrp="1"/>
-          </p:cNvSpPr>
-          <p:nvPr>
-            <p:ph type="title"/>
-          </p:nvPr>
-        </p:nvSpPr>
-        <p:spPr/>
-        <p:txBody>
-          <a:bodyPr/>
-          <a:lstStyle/>
-          <a:p>
-            <a:r>
-              <a:rPr lang="en-US" smtClean="0"/>
-              <a:t>Naïve Bayes Classifier</a:t>
-            </a:r>
-          </a:p>
-        </p:txBody>
-      </p:sp>
-      <p:sp>
-        <p:nvSpPr>
-          <p:cNvPr id="18434" name="Content Placeholder 5"/>
-          <p:cNvSpPr>
-            <a:spLocks noGrp="1"/>
-          </p:cNvSpPr>
-          <p:nvPr>
-            <p:ph idx="1"/>
-          </p:nvPr>
-        </p:nvSpPr>
-        <p:spPr/>
-        <p:txBody>
-          <a:bodyPr/>
-          <a:lstStyle/>
-          <a:p>
-            <a:r>
-              <a:rPr lang="en-US" smtClean="0"/>
-              <a:t>Probabilistic classifier based on Bayes’ rule:</a:t>
-            </a:r>
-          </a:p>
-          <a:p>
-            <a:endParaRPr lang="en-US" smtClean="0"/>
-          </a:p>
-          <a:p>
-            <a:endParaRPr lang="en-US" smtClean="0"/>
-          </a:p>
-          <a:p>
-            <a:endParaRPr lang="en-US" smtClean="0"/>
-          </a:p>
-          <a:p>
-            <a:r>
-              <a:rPr lang="en-US" i="1" smtClean="0"/>
-              <a:t>C</a:t>
-            </a:r>
-            <a:r>
-              <a:rPr lang="en-US" smtClean="0"/>
-              <a:t> is a random variable corresponding to the class</a:t>
-            </a:r>
-          </a:p>
-          <a:p>
-            <a:r>
-              <a:rPr lang="en-US" i="1" smtClean="0"/>
-              <a:t>D</a:t>
-            </a:r>
-            <a:r>
-              <a:rPr lang="en-US" smtClean="0"/>
-              <a:t> is a random variable corresponding to the input (e.g. document)</a:t>
-            </a:r>
-          </a:p>
-        </p:txBody>
-      </p:sp>
-      <p:pic>
-        <p:nvPicPr>
-          <p:cNvPr id="18435" name="Content Placeholder 4" descr="TP_tmp.png"/>
-          <p:cNvPicPr>
-            <a:picLocks noChangeAspect="1"/>
-          </p:cNvPicPr>
-          <p:nvPr>
-            <p:custDataLst>
-              <p:tags r:id="rId1"/>
-            </p:custDataLst>
-          </p:nvPr>
-        </p:nvPicPr>
-        <p:blipFill>
-          <a:blip r:embed="rId3">
-            <a:clrChange>
-              <a:clrFrom>
-                <a:srgbClr val="FFFFFF"/>
-              </a:clrFrom>
-              <a:clrTo>
-                <a:srgbClr val="FFFFFF">
-                  <a:alpha val="0"/>
-                </a:srgbClr>
-              </a:clrTo>
-            </a:clrChange>
-          </a:blip>
-          <a:srcRect/>
-          <a:stretch>
-            <a:fillRect/>
-          </a:stretch>
-        </p:blipFill>
-        <p:spPr bwMode="auto">
-          <a:xfrm>
-            <a:off x="1981200" y="2387600"/>
-            <a:ext cx="4673600" cy="1346200"/>
-          </a:xfrm>
-          <a:prstGeom prst="rect">
-            <a:avLst/>
-          </a:prstGeom>
-          <a:noFill/>
-          <a:ln w="9525">
-            <a:noFill/>
-            <a:miter lim="800000"/>
-            <a:headEnd/>
-            <a:tailEnd/>
-          </a:ln>
-        </p:spPr>
-      </p:pic>
-    </p:spTree>
-  </p:cSld>
-  <p:clrMapOvr>
-    <a:masterClrMapping/>
-  </p:clrMapOvr>
-</p:sld>
-</file>
-
-<file path=ppt/slides/slide60.xml><?xml version="1.0" encoding="utf-8"?>
+<file path=ppt/slides/slide61.xml><?xml version="1.0" encoding="utf-8"?>
 <p:sld xmlns:a="http://schemas.openxmlformats.org/drawingml/2006/main" xmlns:r="http://schemas.openxmlformats.org/officeDocument/2006/relationships" xmlns:p="http://schemas.openxmlformats.org/presentationml/2006/main">
   <p:cSld>
     <p:spTree>
@@ -35931,7 +36245,7 @@
 </p:sld>
 </file>
 
-<file path=ppt/slides/slide61.xml><?xml version="1.0" encoding="utf-8"?>
+<file path=ppt/slides/slide62.xml><?xml version="1.0" encoding="utf-8"?>
 <p:sld xmlns:a="http://schemas.openxmlformats.org/drawingml/2006/main" xmlns:r="http://schemas.openxmlformats.org/officeDocument/2006/relationships" xmlns:p="http://schemas.openxmlformats.org/presentationml/2006/main">
   <p:cSld>
     <p:spTree>
@@ -36040,7 +36354,7 @@
 </p:sld>
 </file>
 
-<file path=ppt/slides/slide62.xml><?xml version="1.0" encoding="utf-8"?>
+<file path=ppt/slides/slide63.xml><?xml version="1.0" encoding="utf-8"?>
 <p:sld xmlns:a="http://schemas.openxmlformats.org/drawingml/2006/main" xmlns:r="http://schemas.openxmlformats.org/officeDocument/2006/relationships" xmlns:p="http://schemas.openxmlformats.org/presentationml/2006/main">
   <p:cSld>
     <p:spTree>
@@ -36405,7 +36719,7 @@
 </p:sld>
 </file>
 
-<file path=ppt/slides/slide63.xml><?xml version="1.0" encoding="utf-8"?>
+<file path=ppt/slides/slide64.xml><?xml version="1.0" encoding="utf-8"?>
 <p:sld xmlns:a="http://schemas.openxmlformats.org/drawingml/2006/main" xmlns:r="http://schemas.openxmlformats.org/officeDocument/2006/relationships" xmlns:p="http://schemas.openxmlformats.org/presentationml/2006/main">
   <p:cSld>
     <p:spTree>
@@ -36497,7 +36811,7 @@
 </p:sld>
 </file>
 
-<file path=ppt/slides/slide64.xml><?xml version="1.0" encoding="utf-8"?>
+<file path=ppt/slides/slide65.xml><?xml version="1.0" encoding="utf-8"?>
 <p:sld xmlns:a="http://schemas.openxmlformats.org/drawingml/2006/main" xmlns:r="http://schemas.openxmlformats.org/officeDocument/2006/relationships" xmlns:p="http://schemas.openxmlformats.org/presentationml/2006/main">
   <p:cSld>
     <p:spTree>
@@ -36674,7 +36988,7 @@
 </p:sld>
 </file>
 
-<file path=ppt/slides/slide65.xml><?xml version="1.0" encoding="utf-8"?>
+<file path=ppt/slides/slide66.xml><?xml version="1.0" encoding="utf-8"?>
 <p:sld xmlns:a="http://schemas.openxmlformats.org/drawingml/2006/main" xmlns:r="http://schemas.openxmlformats.org/officeDocument/2006/relationships" xmlns:p="http://schemas.openxmlformats.org/presentationml/2006/main">
   <p:cSld>
     <p:spTree>
@@ -37867,7 +38181,7 @@
 </p:sld>
 </file>
 
-<file path=ppt/slides/slide66.xml><?xml version="1.0" encoding="utf-8"?>
+<file path=ppt/slides/slide67.xml><?xml version="1.0" encoding="utf-8"?>
 <p:sld xmlns:a="http://schemas.openxmlformats.org/drawingml/2006/main" xmlns:r="http://schemas.openxmlformats.org/officeDocument/2006/relationships" xmlns:p="http://schemas.openxmlformats.org/presentationml/2006/main">
   <p:cSld>
     <p:spTree>
@@ -39010,7 +39324,7 @@
 </p:sld>
 </file>
 
-<file path=ppt/slides/slide67.xml><?xml version="1.0" encoding="utf-8"?>
+<file path=ppt/slides/slide68.xml><?xml version="1.0" encoding="utf-8"?>
 <p:sld xmlns:a="http://schemas.openxmlformats.org/drawingml/2006/main" xmlns:r="http://schemas.openxmlformats.org/officeDocument/2006/relationships" xmlns:p="http://schemas.openxmlformats.org/presentationml/2006/main">
   <p:cSld>
     <p:spTree>
@@ -39187,7 +39501,7 @@
 </p:sld>
 </file>
 
-<file path=ppt/slides/slide68.xml><?xml version="1.0" encoding="utf-8"?>
+<file path=ppt/slides/slide69.xml><?xml version="1.0" encoding="utf-8"?>
 <p:sld xmlns:a="http://schemas.openxmlformats.org/drawingml/2006/main" xmlns:r="http://schemas.openxmlformats.org/officeDocument/2006/relationships" xmlns:p="http://schemas.openxmlformats.org/presentationml/2006/main">
   <p:cSld>
     <p:spTree>
@@ -41512,7 +41826,298 @@
 </p:sld>
 </file>
 
-<file path=ppt/slides/slide69.xml><?xml version="1.0" encoding="utf-8"?>
+<file path=ppt/slides/slide7.xml><?xml version="1.0" encoding="utf-8"?>
+<p:sld xmlns:a="http://schemas.openxmlformats.org/drawingml/2006/main" xmlns:r="http://schemas.openxmlformats.org/officeDocument/2006/relationships" xmlns:p="http://schemas.openxmlformats.org/presentationml/2006/main">
+  <p:cSld>
+    <p:spTree>
+      <p:nvGrpSpPr>
+        <p:cNvPr id="1" name=""/>
+        <p:cNvGrpSpPr/>
+        <p:nvPr/>
+      </p:nvGrpSpPr>
+      <p:grpSpPr>
+        <a:xfrm>
+          <a:off x="0" y="0"/>
+          <a:ext cx="0" cy="0"/>
+          <a:chOff x="0" y="0"/>
+          <a:chExt cx="0" cy="0"/>
+        </a:xfrm>
+      </p:grpSpPr>
+      <p:sp>
+        <p:nvSpPr>
+          <p:cNvPr id="19457" name="Title 1"/>
+          <p:cNvSpPr>
+            <a:spLocks noGrp="1"/>
+          </p:cNvSpPr>
+          <p:nvPr>
+            <p:ph type="title"/>
+          </p:nvPr>
+        </p:nvSpPr>
+        <p:spPr/>
+        <p:txBody>
+          <a:bodyPr/>
+          <a:lstStyle/>
+          <a:p>
+            <a:r>
+              <a:rPr lang="en-US" smtClean="0"/>
+              <a:t>Probability 101: Random Variables</a:t>
+            </a:r>
+          </a:p>
+        </p:txBody>
+      </p:sp>
+      <p:sp>
+        <p:nvSpPr>
+          <p:cNvPr id="3" name="Content Placeholder 2"/>
+          <p:cNvSpPr>
+            <a:spLocks noGrp="1"/>
+          </p:cNvSpPr>
+          <p:nvPr>
+            <p:ph idx="1"/>
+          </p:nvPr>
+        </p:nvSpPr>
+        <p:spPr/>
+        <p:txBody>
+          <a:bodyPr>
+            <a:normAutofit fontScale="92500" lnSpcReduction="10000"/>
+          </a:bodyPr>
+          <a:lstStyle/>
+          <a:p>
+            <a:pPr>
+              <a:lnSpc>
+                <a:spcPct val="80000"/>
+              </a:lnSpc>
+            </a:pPr>
+            <a:r>
+              <a:rPr lang="en-US" sz="2700" dirty="0" smtClean="0"/>
+              <a:t>Random variables are non-deterministic</a:t>
+            </a:r>
+          </a:p>
+          <a:p>
+            <a:pPr lvl="1">
+              <a:lnSpc>
+                <a:spcPct val="80000"/>
+              </a:lnSpc>
+            </a:pPr>
+            <a:r>
+              <a:rPr lang="en-US" sz="2400" dirty="0" smtClean="0"/>
+              <a:t>Can be discrete (finite number of outcomes) or </a:t>
+            </a:r>
+            <a:r>
+              <a:rPr lang="en-US" sz="2400" dirty="0" smtClean="0">
+                <a:solidFill>
+                  <a:srgbClr val="00FFFF"/>
+                </a:solidFill>
+              </a:rPr>
+              <a:t>continuous</a:t>
+            </a:r>
+            <a:endParaRPr lang="en-US" sz="2400" dirty="0" smtClean="0"/>
+          </a:p>
+          <a:p>
+            <a:pPr lvl="1">
+              <a:lnSpc>
+                <a:spcPct val="80000"/>
+              </a:lnSpc>
+            </a:pPr>
+            <a:r>
+              <a:rPr lang="en-US" sz="2400" dirty="0" smtClean="0"/>
+              <a:t>Model uncertainty in a variable</a:t>
+            </a:r>
+          </a:p>
+          <a:p>
+            <a:pPr>
+              <a:lnSpc>
+                <a:spcPct val="80000"/>
+              </a:lnSpc>
+            </a:pPr>
+            <a:r>
+              <a:rPr lang="en-US" sz="2700" dirty="0" smtClean="0"/>
+              <a:t>P(</a:t>
+            </a:r>
+            <a:r>
+              <a:rPr lang="en-US" sz="2700" i="1" dirty="0" smtClean="0"/>
+              <a:t>X</a:t>
+            </a:r>
+            <a:r>
+              <a:rPr lang="en-US" sz="2700" dirty="0" smtClean="0"/>
+              <a:t> = </a:t>
+            </a:r>
+            <a:r>
+              <a:rPr lang="en-US" sz="2700" i="1" dirty="0" smtClean="0"/>
+              <a:t>x</a:t>
+            </a:r>
+            <a:r>
+              <a:rPr lang="en-US" sz="2700" dirty="0" smtClean="0"/>
+              <a:t>) means “the probability that random variable X takes on value x”</a:t>
+            </a:r>
+          </a:p>
+          <a:p>
+            <a:pPr lvl="1">
+              <a:lnSpc>
+                <a:spcPct val="80000"/>
+              </a:lnSpc>
+            </a:pPr>
+            <a:r>
+              <a:rPr lang="en-US" sz="2300" dirty="0" smtClean="0">
+                <a:solidFill>
+                  <a:srgbClr val="17F6FF"/>
+                </a:solidFill>
+              </a:rPr>
+              <a:t>X = random variable, x = particular outcome, </a:t>
+            </a:r>
+            <a:r>
+              <a:rPr lang="en-US" sz="2300" dirty="0" smtClean="0">
+                <a:solidFill>
+                  <a:srgbClr val="17F6FF"/>
+                </a:solidFill>
+                <a:latin typeface="Savoye LET Plain CC.:1.0"/>
+              </a:rPr>
+              <a:t>X</a:t>
+            </a:r>
+            <a:r>
+              <a:rPr lang="en-US" sz="2300" dirty="0" smtClean="0">
+                <a:solidFill>
+                  <a:srgbClr val="17F6FF"/>
+                </a:solidFill>
+              </a:rPr>
+              <a:t> = all possible outcomes</a:t>
+            </a:r>
+          </a:p>
+          <a:p>
+            <a:pPr>
+              <a:lnSpc>
+                <a:spcPct val="80000"/>
+              </a:lnSpc>
+            </a:pPr>
+            <a:r>
+              <a:rPr lang="en-US" sz="2700" dirty="0" smtClean="0"/>
+              <a:t>Example:</a:t>
+            </a:r>
+          </a:p>
+          <a:p>
+            <a:pPr lvl="1">
+              <a:lnSpc>
+                <a:spcPct val="80000"/>
+              </a:lnSpc>
+            </a:pPr>
+            <a:r>
+              <a:rPr lang="en-US" sz="2400" dirty="0" smtClean="0"/>
+              <a:t>Let X be the outcome of a coin toss</a:t>
+            </a:r>
+          </a:p>
+          <a:p>
+            <a:pPr lvl="1">
+              <a:lnSpc>
+                <a:spcPct val="80000"/>
+              </a:lnSpc>
+            </a:pPr>
+            <a:r>
+              <a:rPr lang="en-US" sz="2400" dirty="0" smtClean="0"/>
+              <a:t>P(X = heads) = P(X = tails) = 0.5</a:t>
+            </a:r>
+          </a:p>
+          <a:p>
+            <a:pPr>
+              <a:lnSpc>
+                <a:spcPct val="80000"/>
+              </a:lnSpc>
+            </a:pPr>
+            <a:r>
+              <a:rPr lang="en-US" sz="2700" dirty="0" smtClean="0"/>
+              <a:t>Example: </a:t>
+            </a:r>
+            <a:r>
+              <a:rPr lang="en-US" sz="2700" i="1" dirty="0" smtClean="0"/>
+              <a:t>Y</a:t>
+            </a:r>
+            <a:r>
+              <a:rPr lang="en-US" sz="2700" dirty="0" smtClean="0"/>
+              <a:t> = 5 - 2</a:t>
+            </a:r>
+            <a:r>
+              <a:rPr lang="en-US" sz="2700" i="1" dirty="0" smtClean="0"/>
+              <a:t>X</a:t>
+            </a:r>
+          </a:p>
+          <a:p>
+            <a:pPr lvl="1">
+              <a:lnSpc>
+                <a:spcPct val="80000"/>
+              </a:lnSpc>
+            </a:pPr>
+            <a:r>
+              <a:rPr lang="en-US" sz="2400" dirty="0" smtClean="0"/>
+              <a:t>If </a:t>
+            </a:r>
+            <a:r>
+              <a:rPr lang="en-US" sz="2400" i="1" dirty="0" smtClean="0"/>
+              <a:t>X</a:t>
+            </a:r>
+            <a:r>
+              <a:rPr lang="en-US" sz="2400" dirty="0" smtClean="0"/>
+              <a:t> is random, then </a:t>
+            </a:r>
+            <a:r>
+              <a:rPr lang="en-US" sz="2400" i="1" dirty="0" smtClean="0"/>
+              <a:t>Y</a:t>
+            </a:r>
+            <a:r>
+              <a:rPr lang="en-US" sz="2400" dirty="0" smtClean="0"/>
+              <a:t> is random</a:t>
+            </a:r>
+          </a:p>
+          <a:p>
+            <a:pPr lvl="1">
+              <a:lnSpc>
+                <a:spcPct val="80000"/>
+              </a:lnSpc>
+            </a:pPr>
+            <a:r>
+              <a:rPr lang="en-US" sz="2400" dirty="0" smtClean="0"/>
+              <a:t>If </a:t>
+            </a:r>
+            <a:r>
+              <a:rPr lang="en-US" sz="2400" i="1" dirty="0" smtClean="0"/>
+              <a:t>X</a:t>
+            </a:r>
+            <a:r>
+              <a:rPr lang="en-US" sz="2400" dirty="0" smtClean="0"/>
+              <a:t> is deterministic then </a:t>
+            </a:r>
+            <a:r>
+              <a:rPr lang="en-US" sz="2400" i="1" dirty="0" smtClean="0"/>
+              <a:t>Y</a:t>
+            </a:r>
+            <a:r>
+              <a:rPr lang="en-US" sz="2400" dirty="0" smtClean="0"/>
+              <a:t> is also deterministic</a:t>
+            </a:r>
+          </a:p>
+          <a:p>
+            <a:pPr lvl="2">
+              <a:lnSpc>
+                <a:spcPct val="80000"/>
+              </a:lnSpc>
+            </a:pPr>
+            <a:r>
+              <a:rPr lang="en-US" sz="2000" i="1" dirty="0" smtClean="0"/>
+              <a:t>Note: </a:t>
+            </a:r>
+            <a:r>
+              <a:rPr lang="en-US" sz="2000" dirty="0" smtClean="0"/>
+              <a:t>“Deterministic” just means P(X = x) = 1.0!</a:t>
+            </a:r>
+          </a:p>
+        </p:txBody>
+      </p:sp>
+    </p:spTree>
+  </p:cSld>
+  <p:clrMapOvr>
+    <a:masterClrMapping/>
+  </p:clrMapOvr>
+</p:sld>
+</file>
+
+<file path=ppt/slides/slide70.xml><?xml version="1.0" encoding="utf-8"?>
 <p:sld xmlns:a="http://schemas.openxmlformats.org/drawingml/2006/main" xmlns:r="http://schemas.openxmlformats.org/officeDocument/2006/relationships" xmlns:p="http://schemas.openxmlformats.org/presentationml/2006/main">
   <p:cSld>
     <p:spTree>
@@ -41781,298 +42386,7 @@
 </p:sld>
 </file>
 
-<file path=ppt/slides/slide7.xml><?xml version="1.0" encoding="utf-8"?>
-<p:sld xmlns:a="http://schemas.openxmlformats.org/drawingml/2006/main" xmlns:r="http://schemas.openxmlformats.org/officeDocument/2006/relationships" xmlns:p="http://schemas.openxmlformats.org/presentationml/2006/main">
-  <p:cSld>
-    <p:spTree>
-      <p:nvGrpSpPr>
-        <p:cNvPr id="1" name=""/>
-        <p:cNvGrpSpPr/>
-        <p:nvPr/>
-      </p:nvGrpSpPr>
-      <p:grpSpPr>
-        <a:xfrm>
-          <a:off x="0" y="0"/>
-          <a:ext cx="0" cy="0"/>
-          <a:chOff x="0" y="0"/>
-          <a:chExt cx="0" cy="0"/>
-        </a:xfrm>
-      </p:grpSpPr>
-      <p:sp>
-        <p:nvSpPr>
-          <p:cNvPr id="19457" name="Title 1"/>
-          <p:cNvSpPr>
-            <a:spLocks noGrp="1"/>
-          </p:cNvSpPr>
-          <p:nvPr>
-            <p:ph type="title"/>
-          </p:nvPr>
-        </p:nvSpPr>
-        <p:spPr/>
-        <p:txBody>
-          <a:bodyPr/>
-          <a:lstStyle/>
-          <a:p>
-            <a:r>
-              <a:rPr lang="en-US" smtClean="0"/>
-              <a:t>Probability 101: Random Variables</a:t>
-            </a:r>
-          </a:p>
-        </p:txBody>
-      </p:sp>
-      <p:sp>
-        <p:nvSpPr>
-          <p:cNvPr id="3" name="Content Placeholder 2"/>
-          <p:cNvSpPr>
-            <a:spLocks noGrp="1"/>
-          </p:cNvSpPr>
-          <p:nvPr>
-            <p:ph idx="1"/>
-          </p:nvPr>
-        </p:nvSpPr>
-        <p:spPr/>
-        <p:txBody>
-          <a:bodyPr>
-            <a:normAutofit fontScale="92500" lnSpcReduction="10000"/>
-          </a:bodyPr>
-          <a:lstStyle/>
-          <a:p>
-            <a:pPr>
-              <a:lnSpc>
-                <a:spcPct val="80000"/>
-              </a:lnSpc>
-            </a:pPr>
-            <a:r>
-              <a:rPr lang="en-US" sz="2700" dirty="0" smtClean="0"/>
-              <a:t>Random variables are non-deterministic</a:t>
-            </a:r>
-          </a:p>
-          <a:p>
-            <a:pPr lvl="1">
-              <a:lnSpc>
-                <a:spcPct val="80000"/>
-              </a:lnSpc>
-            </a:pPr>
-            <a:r>
-              <a:rPr lang="en-US" sz="2400" dirty="0" smtClean="0"/>
-              <a:t>Can be discrete (finite number of outcomes) or </a:t>
-            </a:r>
-            <a:r>
-              <a:rPr lang="en-US" sz="2400" dirty="0" smtClean="0">
-                <a:solidFill>
-                  <a:srgbClr val="00FFFF"/>
-                </a:solidFill>
-              </a:rPr>
-              <a:t>continuous</a:t>
-            </a:r>
-            <a:endParaRPr lang="en-US" sz="2400" dirty="0" smtClean="0"/>
-          </a:p>
-          <a:p>
-            <a:pPr lvl="1">
-              <a:lnSpc>
-                <a:spcPct val="80000"/>
-              </a:lnSpc>
-            </a:pPr>
-            <a:r>
-              <a:rPr lang="en-US" sz="2400" dirty="0" smtClean="0"/>
-              <a:t>Model uncertainty in a variable</a:t>
-            </a:r>
-          </a:p>
-          <a:p>
-            <a:pPr>
-              <a:lnSpc>
-                <a:spcPct val="80000"/>
-              </a:lnSpc>
-            </a:pPr>
-            <a:r>
-              <a:rPr lang="en-US" sz="2700" dirty="0" smtClean="0"/>
-              <a:t>P(</a:t>
-            </a:r>
-            <a:r>
-              <a:rPr lang="en-US" sz="2700" i="1" dirty="0" smtClean="0"/>
-              <a:t>X</a:t>
-            </a:r>
-            <a:r>
-              <a:rPr lang="en-US" sz="2700" dirty="0" smtClean="0"/>
-              <a:t> = </a:t>
-            </a:r>
-            <a:r>
-              <a:rPr lang="en-US" sz="2700" i="1" dirty="0" smtClean="0"/>
-              <a:t>x</a:t>
-            </a:r>
-            <a:r>
-              <a:rPr lang="en-US" sz="2700" dirty="0" smtClean="0"/>
-              <a:t>) means “the probability that random variable X takes on value x”</a:t>
-            </a:r>
-          </a:p>
-          <a:p>
-            <a:pPr lvl="1">
-              <a:lnSpc>
-                <a:spcPct val="80000"/>
-              </a:lnSpc>
-            </a:pPr>
-            <a:r>
-              <a:rPr lang="en-US" sz="2300" dirty="0" smtClean="0">
-                <a:solidFill>
-                  <a:srgbClr val="17F6FF"/>
-                </a:solidFill>
-              </a:rPr>
-              <a:t>X = random variable, x = particular outcome, </a:t>
-            </a:r>
-            <a:r>
-              <a:rPr lang="en-US" sz="2300" dirty="0" smtClean="0">
-                <a:solidFill>
-                  <a:srgbClr val="17F6FF"/>
-                </a:solidFill>
-                <a:latin typeface="Savoye LET Plain CC.:1.0"/>
-              </a:rPr>
-              <a:t>X</a:t>
-            </a:r>
-            <a:r>
-              <a:rPr lang="en-US" sz="2300" dirty="0" smtClean="0">
-                <a:solidFill>
-                  <a:srgbClr val="17F6FF"/>
-                </a:solidFill>
-              </a:rPr>
-              <a:t> = all possible outcomes</a:t>
-            </a:r>
-          </a:p>
-          <a:p>
-            <a:pPr>
-              <a:lnSpc>
-                <a:spcPct val="80000"/>
-              </a:lnSpc>
-            </a:pPr>
-            <a:r>
-              <a:rPr lang="en-US" sz="2700" dirty="0" smtClean="0"/>
-              <a:t>Example:</a:t>
-            </a:r>
-          </a:p>
-          <a:p>
-            <a:pPr lvl="1">
-              <a:lnSpc>
-                <a:spcPct val="80000"/>
-              </a:lnSpc>
-            </a:pPr>
-            <a:r>
-              <a:rPr lang="en-US" sz="2400" dirty="0" smtClean="0"/>
-              <a:t>Let X be the outcome of a coin toss</a:t>
-            </a:r>
-          </a:p>
-          <a:p>
-            <a:pPr lvl="1">
-              <a:lnSpc>
-                <a:spcPct val="80000"/>
-              </a:lnSpc>
-            </a:pPr>
-            <a:r>
-              <a:rPr lang="en-US" sz="2400" dirty="0" smtClean="0"/>
-              <a:t>P(X = heads) = P(X = tails) = 0.5</a:t>
-            </a:r>
-          </a:p>
-          <a:p>
-            <a:pPr>
-              <a:lnSpc>
-                <a:spcPct val="80000"/>
-              </a:lnSpc>
-            </a:pPr>
-            <a:r>
-              <a:rPr lang="en-US" sz="2700" dirty="0" smtClean="0"/>
-              <a:t>Example: </a:t>
-            </a:r>
-            <a:r>
-              <a:rPr lang="en-US" sz="2700" i="1" dirty="0" smtClean="0"/>
-              <a:t>Y</a:t>
-            </a:r>
-            <a:r>
-              <a:rPr lang="en-US" sz="2700" dirty="0" smtClean="0"/>
-              <a:t> = 5 - 2</a:t>
-            </a:r>
-            <a:r>
-              <a:rPr lang="en-US" sz="2700" i="1" dirty="0" smtClean="0"/>
-              <a:t>X</a:t>
-            </a:r>
-          </a:p>
-          <a:p>
-            <a:pPr lvl="1">
-              <a:lnSpc>
-                <a:spcPct val="80000"/>
-              </a:lnSpc>
-            </a:pPr>
-            <a:r>
-              <a:rPr lang="en-US" sz="2400" dirty="0" smtClean="0"/>
-              <a:t>If </a:t>
-            </a:r>
-            <a:r>
-              <a:rPr lang="en-US" sz="2400" i="1" dirty="0" smtClean="0"/>
-              <a:t>X</a:t>
-            </a:r>
-            <a:r>
-              <a:rPr lang="en-US" sz="2400" dirty="0" smtClean="0"/>
-              <a:t> is random, then </a:t>
-            </a:r>
-            <a:r>
-              <a:rPr lang="en-US" sz="2400" i="1" dirty="0" smtClean="0"/>
-              <a:t>Y</a:t>
-            </a:r>
-            <a:r>
-              <a:rPr lang="en-US" sz="2400" dirty="0" smtClean="0"/>
-              <a:t> is random</a:t>
-            </a:r>
-          </a:p>
-          <a:p>
-            <a:pPr lvl="1">
-              <a:lnSpc>
-                <a:spcPct val="80000"/>
-              </a:lnSpc>
-            </a:pPr>
-            <a:r>
-              <a:rPr lang="en-US" sz="2400" dirty="0" smtClean="0"/>
-              <a:t>If </a:t>
-            </a:r>
-            <a:r>
-              <a:rPr lang="en-US" sz="2400" i="1" dirty="0" smtClean="0"/>
-              <a:t>X</a:t>
-            </a:r>
-            <a:r>
-              <a:rPr lang="en-US" sz="2400" dirty="0" smtClean="0"/>
-              <a:t> is deterministic then </a:t>
-            </a:r>
-            <a:r>
-              <a:rPr lang="en-US" sz="2400" i="1" dirty="0" smtClean="0"/>
-              <a:t>Y</a:t>
-            </a:r>
-            <a:r>
-              <a:rPr lang="en-US" sz="2400" dirty="0" smtClean="0"/>
-              <a:t> is also deterministic</a:t>
-            </a:r>
-          </a:p>
-          <a:p>
-            <a:pPr lvl="2">
-              <a:lnSpc>
-                <a:spcPct val="80000"/>
-              </a:lnSpc>
-            </a:pPr>
-            <a:r>
-              <a:rPr lang="en-US" sz="2000" i="1" dirty="0" smtClean="0"/>
-              <a:t>Note: </a:t>
-            </a:r>
-            <a:r>
-              <a:rPr lang="en-US" sz="2000" dirty="0" smtClean="0"/>
-              <a:t>“Deterministic” just means P(X = x) = 1.0!</a:t>
-            </a:r>
-          </a:p>
-        </p:txBody>
-      </p:sp>
-    </p:spTree>
-  </p:cSld>
-  <p:clrMapOvr>
-    <a:masterClrMapping/>
-  </p:clrMapOvr>
-</p:sld>
-</file>
-
-<file path=ppt/slides/slide70.xml><?xml version="1.0" encoding="utf-8"?>
+<file path=ppt/slides/slide71.xml><?xml version="1.0" encoding="utf-8"?>
 <p:sld xmlns:a="http://schemas.openxmlformats.org/drawingml/2006/main" xmlns:r="http://schemas.openxmlformats.org/officeDocument/2006/relationships" xmlns:p="http://schemas.openxmlformats.org/presentationml/2006/main">
   <p:cSld>
     <p:spTree>
@@ -42297,7 +42611,7 @@
 </p:sld>
 </file>
 
-<file path=ppt/slides/slide71.xml><?xml version="1.0" encoding="utf-8"?>
+<file path=ppt/slides/slide72.xml><?xml version="1.0" encoding="utf-8"?>
 <p:sld xmlns:a="http://schemas.openxmlformats.org/drawingml/2006/main" xmlns:r="http://schemas.openxmlformats.org/officeDocument/2006/relationships" xmlns:p="http://schemas.openxmlformats.org/presentationml/2006/main">
   <p:cSld>
     <p:spTree>
@@ -44741,7 +45055,7 @@
 </p:sld>
 </file>
 
-<file path=ppt/slides/slide72.xml><?xml version="1.0" encoding="utf-8"?>
+<file path=ppt/slides/slide73.xml><?xml version="1.0" encoding="utf-8"?>
 <p:sld xmlns:a="http://schemas.openxmlformats.org/drawingml/2006/main" xmlns:r="http://schemas.openxmlformats.org/officeDocument/2006/relationships" xmlns:p="http://schemas.openxmlformats.org/presentationml/2006/main">
   <p:cSld>
     <p:spTree>
@@ -45275,7 +45589,11 @@
           <a:p>
             <a:r>
               <a:rPr lang="en-US" sz="1000" dirty="0" smtClean="0"/>
-              <a:t>cf. online ads, slide 48</a:t>
+              <a:t>cf. online ads, </a:t>
+            </a:r>
+            <a:r>
+              <a:rPr lang="en-US" sz="1000" smtClean="0"/>
+              <a:t>slide 49</a:t>
             </a:r>
             <a:endParaRPr lang="en-US" sz="1000" dirty="0"/>
           </a:p>
@@ -45296,7 +45614,7 @@
 </p:sld>
 </file>
 
-<file path=ppt/slides/slide73.xml><?xml version="1.0" encoding="utf-8"?>
+<file path=ppt/slides/slide74.xml><?xml version="1.0" encoding="utf-8"?>
 <p:sld xmlns:a="http://schemas.openxmlformats.org/drawingml/2006/main" xmlns:r="http://schemas.openxmlformats.org/officeDocument/2006/relationships" xmlns:p="http://schemas.openxmlformats.org/presentationml/2006/main">
   <p:cSld>
     <p:spTree>

</xml_diff>

<commit_message>
updated chapter 9 slides
</commit_message>
<xml_diff>
--- a/slides/chap9-mln.pptx
+++ b/slides/chap9-mln.pptx
@@ -5014,6 +5014,13 @@
   <p:clrMapOvr>
     <a:masterClrMapping/>
   </p:clrMapOvr>
+  <p:timing>
+    <p:tnLst>
+      <p:par>
+        <p:cTn xmlns:p14="http://schemas.microsoft.com/office/powerpoint/2010/main" id="1" dur="indefinite" restart="never" nodeType="tmRoot"/>
+      </p:par>
+    </p:tnLst>
+  </p:timing>
 </p:sld>
 </file>
 
@@ -5125,6 +5132,13 @@
   <p:clrMapOvr>
     <a:masterClrMapping/>
   </p:clrMapOvr>
+  <p:timing>
+    <p:tnLst>
+      <p:par>
+        <p:cTn xmlns:p14="http://schemas.microsoft.com/office/powerpoint/2010/main" id="1" dur="indefinite" restart="never" nodeType="tmRoot"/>
+      </p:par>
+    </p:tnLst>
+  </p:timing>
 </p:sld>
 </file>
 
@@ -7344,6 +7358,13 @@
   <p:clrMapOvr>
     <a:masterClrMapping/>
   </p:clrMapOvr>
+  <p:timing>
+    <p:tnLst>
+      <p:par>
+        <p:cTn xmlns:p14="http://schemas.microsoft.com/office/powerpoint/2010/main" id="1" dur="indefinite" restart="never" nodeType="tmRoot"/>
+      </p:par>
+    </p:tnLst>
+  </p:timing>
 </p:sld>
 </file>
 
@@ -9417,6 +9438,13 @@
   <p:clrMapOvr>
     <a:masterClrMapping/>
   </p:clrMapOvr>
+  <p:timing>
+    <p:tnLst>
+      <p:par>
+        <p:cTn xmlns:p14="http://schemas.microsoft.com/office/powerpoint/2010/main" id="1" dur="indefinite" restart="never" nodeType="tmRoot"/>
+      </p:par>
+    </p:tnLst>
+  </p:timing>
 </p:sld>
 </file>
 
@@ -11760,6 +11788,13 @@
   <p:clrMapOvr>
     <a:masterClrMapping/>
   </p:clrMapOvr>
+  <p:timing>
+    <p:tnLst>
+      <p:par>
+        <p:cTn xmlns:p14="http://schemas.microsoft.com/office/powerpoint/2010/main" id="1" dur="indefinite" restart="never" nodeType="tmRoot"/>
+      </p:par>
+    </p:tnLst>
+  </p:timing>
 </p:sld>
 </file>
 
@@ -11945,6 +11980,13 @@
   <p:clrMapOvr>
     <a:masterClrMapping/>
   </p:clrMapOvr>
+  <p:timing>
+    <p:tnLst>
+      <p:par>
+        <p:cTn xmlns:p14="http://schemas.microsoft.com/office/powerpoint/2010/main" id="1" dur="indefinite" restart="never" nodeType="tmRoot"/>
+      </p:par>
+    </p:tnLst>
+  </p:timing>
 </p:sld>
 </file>
 
@@ -12356,6 +12398,13 @@
   <p:clrMapOvr>
     <a:masterClrMapping/>
   </p:clrMapOvr>
+  <p:timing>
+    <p:tnLst>
+      <p:par>
+        <p:cTn xmlns:p14="http://schemas.microsoft.com/office/powerpoint/2010/main" id="1" dur="indefinite" restart="never" nodeType="tmRoot"/>
+      </p:par>
+    </p:tnLst>
+  </p:timing>
 </p:sld>
 </file>
 
@@ -12493,6 +12542,13 @@
   <p:clrMapOvr>
     <a:masterClrMapping/>
   </p:clrMapOvr>
+  <p:timing>
+    <p:tnLst>
+      <p:par>
+        <p:cTn xmlns:p14="http://schemas.microsoft.com/office/powerpoint/2010/main" id="1" dur="indefinite" restart="never" nodeType="tmRoot"/>
+      </p:par>
+    </p:tnLst>
+  </p:timing>
 </p:sld>
 </file>
 
@@ -13320,6 +13376,13 @@
   <p:clrMapOvr>
     <a:masterClrMapping/>
   </p:clrMapOvr>
+  <p:timing>
+    <p:tnLst>
+      <p:par>
+        <p:cTn xmlns:p14="http://schemas.microsoft.com/office/powerpoint/2010/main" id="1" dur="indefinite" restart="never" nodeType="tmRoot"/>
+      </p:par>
+    </p:tnLst>
+  </p:timing>
 </p:sld>
 </file>
 
@@ -13859,6 +13922,13 @@
   <p:clrMapOvr>
     <a:masterClrMapping/>
   </p:clrMapOvr>
+  <p:timing>
+    <p:tnLst>
+      <p:par>
+        <p:cTn xmlns:p14="http://schemas.microsoft.com/office/powerpoint/2010/main" id="1" dur="indefinite" restart="never" nodeType="tmRoot"/>
+      </p:par>
+    </p:tnLst>
+  </p:timing>
 </p:sld>
 </file>
 
@@ -14058,6 +14128,13 @@
   <p:clrMapOvr>
     <a:masterClrMapping/>
   </p:clrMapOvr>
+  <p:timing>
+    <p:tnLst>
+      <p:par>
+        <p:cTn xmlns:p14="http://schemas.microsoft.com/office/powerpoint/2010/main" id="1" dur="indefinite" restart="never" nodeType="tmRoot"/>
+      </p:par>
+    </p:tnLst>
+  </p:timing>
 </p:sld>
 </file>
 
@@ -14479,6 +14556,13 @@
   <p:clrMapOvr>
     <a:masterClrMapping/>
   </p:clrMapOvr>
+  <p:timing>
+    <p:tnLst>
+      <p:par>
+        <p:cTn xmlns:p14="http://schemas.microsoft.com/office/powerpoint/2010/main" id="1" dur="indefinite" restart="never" nodeType="tmRoot"/>
+      </p:par>
+    </p:tnLst>
+  </p:timing>
 </p:sld>
 </file>
 
@@ -14582,6 +14666,13 @@
   <p:clrMapOvr>
     <a:masterClrMapping/>
   </p:clrMapOvr>
+  <p:timing>
+    <p:tnLst>
+      <p:par>
+        <p:cTn xmlns:p14="http://schemas.microsoft.com/office/powerpoint/2010/main" id="1" dur="indefinite" restart="never" nodeType="tmRoot"/>
+      </p:par>
+    </p:tnLst>
+  </p:timing>
 </p:sld>
 </file>
 
@@ -14892,6 +14983,13 @@
   <p:clrMapOvr>
     <a:masterClrMapping/>
   </p:clrMapOvr>
+  <p:timing>
+    <p:tnLst>
+      <p:par>
+        <p:cTn xmlns:p14="http://schemas.microsoft.com/office/powerpoint/2010/main" id="1" dur="indefinite" restart="never" nodeType="tmRoot"/>
+      </p:par>
+    </p:tnLst>
+  </p:timing>
 </p:sld>
 </file>
 
@@ -20505,6 +20603,13 @@
   <p:clrMapOvr>
     <a:masterClrMapping/>
   </p:clrMapOvr>
+  <p:timing>
+    <p:tnLst>
+      <p:par>
+        <p:cTn xmlns:p14="http://schemas.microsoft.com/office/powerpoint/2010/main" id="1" dur="indefinite" restart="never" nodeType="tmRoot"/>
+      </p:par>
+    </p:tnLst>
+  </p:timing>
 </p:sld>
 </file>
 
@@ -20598,6 +20703,13 @@
   <p:clrMapOvr>
     <a:masterClrMapping/>
   </p:clrMapOvr>
+  <p:timing>
+    <p:tnLst>
+      <p:par>
+        <p:cTn xmlns:p14="http://schemas.microsoft.com/office/powerpoint/2010/main" id="1" dur="indefinite" restart="never" nodeType="tmRoot"/>
+      </p:par>
+    </p:tnLst>
+  </p:timing>
 </p:sld>
 </file>
 
@@ -20930,6 +21042,13 @@
   <p:clrMapOvr>
     <a:masterClrMapping/>
   </p:clrMapOvr>
+  <p:timing>
+    <p:tnLst>
+      <p:par>
+        <p:cTn xmlns:p14="http://schemas.microsoft.com/office/powerpoint/2010/main" id="1" dur="indefinite" restart="never" nodeType="tmRoot"/>
+      </p:par>
+    </p:tnLst>
+  </p:timing>
 </p:sld>
 </file>
 
@@ -21193,6 +21312,13 @@
   <p:clrMapOvr>
     <a:masterClrMapping/>
   </p:clrMapOvr>
+  <p:timing>
+    <p:tnLst>
+      <p:par>
+        <p:cTn xmlns:p14="http://schemas.microsoft.com/office/powerpoint/2010/main" id="1" dur="indefinite" restart="never" nodeType="tmRoot"/>
+      </p:par>
+    </p:tnLst>
+  </p:timing>
 </p:sld>
 </file>
 
@@ -21623,6 +21749,13 @@
   <p:clrMapOvr>
     <a:masterClrMapping/>
   </p:clrMapOvr>
+  <p:timing>
+    <p:tnLst>
+      <p:par>
+        <p:cTn xmlns:p14="http://schemas.microsoft.com/office/powerpoint/2010/main" id="1" dur="indefinite" restart="never" nodeType="tmRoot"/>
+      </p:par>
+    </p:tnLst>
+  </p:timing>
 </p:sld>
 </file>
 
@@ -21726,6 +21859,13 @@
   <p:clrMapOvr>
     <a:masterClrMapping/>
   </p:clrMapOvr>
+  <p:timing>
+    <p:tnLst>
+      <p:par>
+        <p:cTn xmlns:p14="http://schemas.microsoft.com/office/powerpoint/2010/main" id="1" dur="indefinite" restart="never" nodeType="tmRoot"/>
+      </p:par>
+    </p:tnLst>
+  </p:timing>
 </p:sld>
 </file>
 
@@ -21969,6 +22109,13 @@
   <p:clrMapOvr>
     <a:masterClrMapping/>
   </p:clrMapOvr>
+  <p:timing>
+    <p:tnLst>
+      <p:par>
+        <p:cTn xmlns:p14="http://schemas.microsoft.com/office/powerpoint/2010/main" id="1" dur="indefinite" restart="never" nodeType="tmRoot"/>
+      </p:par>
+    </p:tnLst>
+  </p:timing>
 </p:sld>
 </file>
 
@@ -22027,7 +22174,7 @@
           <a:graphicData uri="http://schemas.openxmlformats.org/presentationml/2006/ole">
             <mc:AlternateContent xmlns:mc="http://schemas.openxmlformats.org/markup-compatibility/2006">
               <mc:Choice xmlns:v="urn:schemas-microsoft-com:vml" Requires="v">
-                <p:oleObj spid="_x0000_s2080" name="Acrobat Document" r:id="rId3" imgW="5118100" imgH="6146800" progId="">
+                <p:oleObj spid="_x0000_s2082" name="Acrobat Document" r:id="rId3" imgW="5118100" imgH="6146800" progId="">
                   <p:embed/>
                 </p:oleObj>
               </mc:Choice>
@@ -22111,6 +22258,13 @@
   <p:clrMapOvr>
     <a:masterClrMapping/>
   </p:clrMapOvr>
+  <p:timing>
+    <p:tnLst>
+      <p:par>
+        <p:cTn xmlns:p14="http://schemas.microsoft.com/office/powerpoint/2010/main" id="1" dur="indefinite" restart="never" nodeType="tmRoot"/>
+      </p:par>
+    </p:tnLst>
+  </p:timing>
 </p:sld>
 </file>
 
@@ -22291,6 +22445,13 @@
   <p:clrMapOvr>
     <a:masterClrMapping/>
   </p:clrMapOvr>
+  <p:timing>
+    <p:tnLst>
+      <p:par>
+        <p:cTn xmlns:p14="http://schemas.microsoft.com/office/powerpoint/2010/main" id="1" dur="indefinite" restart="never" nodeType="tmRoot"/>
+      </p:par>
+    </p:tnLst>
+  </p:timing>
 </p:sld>
 </file>
 
@@ -22349,7 +22510,7 @@
           <a:graphicData uri="http://schemas.openxmlformats.org/presentationml/2006/ole">
             <mc:AlternateContent xmlns:mc="http://schemas.openxmlformats.org/markup-compatibility/2006">
               <mc:Choice xmlns:v="urn:schemas-microsoft-com:vml" Requires="v">
-                <p:oleObj spid="_x0000_s1056" name="Acrobat Document" r:id="rId3" imgW="4775200" imgH="3314700" progId="">
+                <p:oleObj spid="_x0000_s1058" name="Acrobat Document" r:id="rId3" imgW="4775200" imgH="3314700" progId="">
                   <p:embed/>
                 </p:oleObj>
               </mc:Choice>
@@ -22433,6 +22594,13 @@
   <p:clrMapOvr>
     <a:masterClrMapping/>
   </p:clrMapOvr>
+  <p:timing>
+    <p:tnLst>
+      <p:par>
+        <p:cTn xmlns:p14="http://schemas.microsoft.com/office/powerpoint/2010/main" id="1" dur="indefinite" restart="never" nodeType="tmRoot"/>
+      </p:par>
+    </p:tnLst>
+  </p:timing>
 </p:sld>
 </file>
 
@@ -22629,6 +22797,13 @@
   <p:clrMapOvr>
     <a:masterClrMapping/>
   </p:clrMapOvr>
+  <p:timing>
+    <p:tnLst>
+      <p:par>
+        <p:cTn xmlns:p14="http://schemas.microsoft.com/office/powerpoint/2010/main" id="1" dur="indefinite" restart="never" nodeType="tmRoot"/>
+      </p:par>
+    </p:tnLst>
+  </p:timing>
 </p:sld>
 </file>
 
@@ -22828,6 +23003,13 @@
   <p:clrMapOvr>
     <a:masterClrMapping/>
   </p:clrMapOvr>
+  <p:timing>
+    <p:tnLst>
+      <p:par>
+        <p:cTn xmlns:p14="http://schemas.microsoft.com/office/powerpoint/2010/main" id="1" dur="indefinite" restart="never" nodeType="tmRoot"/>
+      </p:par>
+    </p:tnLst>
+  </p:timing>
 </p:sld>
 </file>
 
@@ -22886,7 +23068,7 @@
           <a:graphicData uri="http://schemas.openxmlformats.org/presentationml/2006/ole">
             <mc:AlternateContent xmlns:mc="http://schemas.openxmlformats.org/markup-compatibility/2006">
               <mc:Choice xmlns:v="urn:schemas-microsoft-com:vml" Requires="v">
-                <p:oleObj spid="_x0000_s3104" name="Acrobat Document" r:id="rId3" imgW="3695700" imgH="4445000" progId="">
+                <p:oleObj spid="_x0000_s3106" name="Acrobat Document" r:id="rId3" imgW="3695700" imgH="4445000" progId="">
                   <p:embed/>
                 </p:oleObj>
               </mc:Choice>
@@ -22970,6 +23152,13 @@
   <p:clrMapOvr>
     <a:masterClrMapping/>
   </p:clrMapOvr>
+  <p:timing>
+    <p:tnLst>
+      <p:par>
+        <p:cTn xmlns:p14="http://schemas.microsoft.com/office/powerpoint/2010/main" id="1" dur="indefinite" restart="never" nodeType="tmRoot"/>
+      </p:par>
+    </p:tnLst>
+  </p:timing>
 </p:sld>
 </file>
 
@@ -23103,6 +23292,13 @@
   <p:clrMapOvr>
     <a:masterClrMapping/>
   </p:clrMapOvr>
+  <p:timing>
+    <p:tnLst>
+      <p:par>
+        <p:cTn xmlns:p14="http://schemas.microsoft.com/office/powerpoint/2010/main" id="1" dur="indefinite" restart="never" nodeType="tmRoot"/>
+      </p:par>
+    </p:tnLst>
+  </p:timing>
 </p:sld>
 </file>
 
@@ -23205,6 +23401,13 @@
   <p:clrMapOvr>
     <a:masterClrMapping/>
   </p:clrMapOvr>
+  <p:timing>
+    <p:tnLst>
+      <p:par>
+        <p:cTn xmlns:p14="http://schemas.microsoft.com/office/powerpoint/2010/main" id="1" dur="indefinite" restart="never" nodeType="tmRoot"/>
+      </p:par>
+    </p:tnLst>
+  </p:timing>
 </p:sld>
 </file>
 
@@ -23476,6 +23679,13 @@
   <p:clrMapOvr>
     <a:masterClrMapping/>
   </p:clrMapOvr>
+  <p:timing>
+    <p:tnLst>
+      <p:par>
+        <p:cTn xmlns:p14="http://schemas.microsoft.com/office/powerpoint/2010/main" id="1" dur="indefinite" restart="never" nodeType="tmRoot"/>
+      </p:par>
+    </p:tnLst>
+  </p:timing>
 </p:sld>
 </file>
 
@@ -24407,6 +24617,13 @@
   <p:clrMapOvr>
     <a:masterClrMapping/>
   </p:clrMapOvr>
+  <p:timing>
+    <p:tnLst>
+      <p:par>
+        <p:cTn xmlns:p14="http://schemas.microsoft.com/office/powerpoint/2010/main" id="1" dur="indefinite" restart="never" nodeType="tmRoot"/>
+      </p:par>
+    </p:tnLst>
+  </p:timing>
 </p:sld>
 </file>
 
@@ -24576,6 +24793,13 @@
   <p:clrMapOvr>
     <a:masterClrMapping/>
   </p:clrMapOvr>
+  <p:timing>
+    <p:tnLst>
+      <p:par>
+        <p:cTn xmlns:p14="http://schemas.microsoft.com/office/powerpoint/2010/main" id="1" dur="indefinite" restart="never" nodeType="tmRoot"/>
+      </p:par>
+    </p:tnLst>
+  </p:timing>
 </p:sld>
 </file>
 
@@ -24783,11 +25007,185 @@
           </a:p>
         </p:txBody>
       </p:sp>
+      <p:grpSp>
+        <p:nvGrpSpPr>
+          <p:cNvPr id="5" name="Group 4"/>
+          <p:cNvGrpSpPr/>
+          <p:nvPr/>
+        </p:nvGrpSpPr>
+        <p:grpSpPr>
+          <a:xfrm>
+            <a:off x="5076056" y="3573016"/>
+            <a:ext cx="3571711" cy="2887871"/>
+            <a:chOff x="5076056" y="3573016"/>
+            <a:chExt cx="3571711" cy="2887871"/>
+          </a:xfrm>
+        </p:grpSpPr>
+        <p:pic>
+          <p:nvPicPr>
+            <p:cNvPr id="2" name="Picture 1"/>
+            <p:cNvPicPr>
+              <a:picLocks noChangeAspect="1"/>
+            </p:cNvPicPr>
+            <p:nvPr/>
+          </p:nvPicPr>
+          <p:blipFill>
+            <a:blip r:embed="rId2"/>
+            <a:stretch>
+              <a:fillRect/>
+            </a:stretch>
+          </p:blipFill>
+          <p:spPr>
+            <a:xfrm>
+              <a:off x="5364088" y="3573016"/>
+              <a:ext cx="2915816" cy="1940840"/>
+            </a:xfrm>
+            <a:prstGeom prst="rect">
+              <a:avLst/>
+            </a:prstGeom>
+          </p:spPr>
+        </p:pic>
+        <p:sp>
+          <p:nvSpPr>
+            <p:cNvPr id="4" name="TextBox 3"/>
+            <p:cNvSpPr txBox="1"/>
+            <p:nvPr/>
+          </p:nvSpPr>
+          <p:spPr>
+            <a:xfrm>
+              <a:off x="5076056" y="5445224"/>
+              <a:ext cx="3571711" cy="1015663"/>
+            </a:xfrm>
+            <a:prstGeom prst="rect">
+              <a:avLst/>
+            </a:prstGeom>
+            <a:noFill/>
+          </p:spPr>
+          <p:txBody>
+            <a:bodyPr wrap="none" rtlCol="0">
+              <a:spAutoFit/>
+            </a:bodyPr>
+            <a:lstStyle/>
+            <a:p>
+              <a:r>
+                <a:rPr lang="en-US" sz="1600" dirty="0" smtClean="0"/>
+                <a:t>then you encounter these…</a:t>
+              </a:r>
+            </a:p>
+            <a:p>
+              <a:r>
+                <a:rPr lang="en-US" sz="1600" dirty="0" smtClean="0"/>
+                <a:t>perhaps you’ve identified the</a:t>
+              </a:r>
+            </a:p>
+            <a:p>
+              <a:r>
+                <a:rPr lang="en-US" sz="1600" dirty="0" smtClean="0"/>
+                <a:t>wrong features?</a:t>
+              </a:r>
+            </a:p>
+            <a:p>
+              <a:r>
+                <a:rPr lang="en-US" sz="1200" dirty="0">
+                  <a:hlinkClick r:id="rId3"/>
+                </a:rPr>
+                <a:t>http://www.medicalmedium.com/blog/bell-</a:t>
+              </a:r>
+              <a:r>
+                <a:rPr lang="en-US" sz="1200" dirty="0" smtClean="0">
+                  <a:hlinkClick r:id="rId3"/>
+                </a:rPr>
+                <a:t>peppers</a:t>
+              </a:r>
+              <a:r>
+                <a:rPr lang="en-US" sz="1200" dirty="0" smtClean="0"/>
+                <a:t> </a:t>
+              </a:r>
+              <a:endParaRPr lang="en-US" sz="1200" dirty="0"/>
+            </a:p>
+          </p:txBody>
+        </p:sp>
+      </p:grpSp>
     </p:spTree>
   </p:cSld>
   <p:clrMapOvr>
     <a:masterClrMapping/>
   </p:clrMapOvr>
+  <p:timing>
+    <p:tnLst>
+      <p:par>
+        <p:cTn xmlns:p14="http://schemas.microsoft.com/office/powerpoint/2010/main" id="1" dur="indefinite" restart="never" nodeType="tmRoot">
+          <p:childTnLst>
+            <p:seq concurrent="1" nextAc="seek">
+              <p:cTn id="2" dur="indefinite" nodeType="mainSeq">
+                <p:childTnLst>
+                  <p:par>
+                    <p:cTn id="3" fill="hold">
+                      <p:stCondLst>
+                        <p:cond delay="indefinite"/>
+                      </p:stCondLst>
+                      <p:childTnLst>
+                        <p:par>
+                          <p:cTn id="4" fill="hold">
+                            <p:stCondLst>
+                              <p:cond delay="0"/>
+                            </p:stCondLst>
+                            <p:childTnLst>
+                              <p:par>
+                                <p:cTn id="5" presetID="1" presetClass="entr" presetSubtype="0" fill="hold" nodeType="clickEffect">
+                                  <p:stCondLst>
+                                    <p:cond delay="0"/>
+                                  </p:stCondLst>
+                                  <p:childTnLst>
+                                    <p:set>
+                                      <p:cBhvr>
+                                        <p:cTn id="6" dur="1" fill="hold">
+                                          <p:stCondLst>
+                                            <p:cond delay="0"/>
+                                          </p:stCondLst>
+                                        </p:cTn>
+                                        <p:tgtEl>
+                                          <p:spTgt spid="5"/>
+                                        </p:tgtEl>
+                                        <p:attrNameLst>
+                                          <p:attrName>style.visibility</p:attrName>
+                                        </p:attrNameLst>
+                                      </p:cBhvr>
+                                      <p:to>
+                                        <p:strVal val="visible"/>
+                                      </p:to>
+                                    </p:set>
+                                  </p:childTnLst>
+                                </p:cTn>
+                              </p:par>
+                            </p:childTnLst>
+                          </p:cTn>
+                        </p:par>
+                      </p:childTnLst>
+                    </p:cTn>
+                  </p:par>
+                </p:childTnLst>
+              </p:cTn>
+              <p:prevCondLst>
+                <p:cond evt="onPrev" delay="0">
+                  <p:tgtEl>
+                    <p:sldTgt/>
+                  </p:tgtEl>
+                </p:cond>
+              </p:prevCondLst>
+              <p:nextCondLst>
+                <p:cond evt="onNext" delay="0">
+                  <p:tgtEl>
+                    <p:sldTgt/>
+                  </p:tgtEl>
+                </p:cond>
+              </p:nextCondLst>
+            </p:seq>
+          </p:childTnLst>
+        </p:cTn>
+      </p:par>
+    </p:tnLst>
+  </p:timing>
 </p:sld>
 </file>
 
@@ -24967,6 +25365,13 @@
   <p:clrMapOvr>
     <a:masterClrMapping/>
   </p:clrMapOvr>
+  <p:timing>
+    <p:tnLst>
+      <p:par>
+        <p:cTn xmlns:p14="http://schemas.microsoft.com/office/powerpoint/2010/main" id="1" dur="indefinite" restart="never" nodeType="tmRoot"/>
+      </p:par>
+    </p:tnLst>
+  </p:timing>
 </p:sld>
 </file>
 
@@ -31582,6 +31987,13 @@
   <p:clrMapOvr>
     <a:masterClrMapping/>
   </p:clrMapOvr>
+  <p:timing>
+    <p:tnLst>
+      <p:par>
+        <p:cTn xmlns:p14="http://schemas.microsoft.com/office/powerpoint/2010/main" id="1" dur="indefinite" restart="never" nodeType="tmRoot"/>
+      </p:par>
+    </p:tnLst>
+  </p:timing>
 </p:sld>
 </file>
 
@@ -45589,11 +46001,7 @@
           <a:p>
             <a:r>
               <a:rPr lang="en-US" sz="1000" dirty="0" smtClean="0"/>
-              <a:t>cf. online ads, </a:t>
-            </a:r>
-            <a:r>
-              <a:rPr lang="en-US" sz="1000" smtClean="0"/>
-              <a:t>slide 49</a:t>
+              <a:t>cf. online ads, slide 49</a:t>
             </a:r>
             <a:endParaRPr lang="en-US" sz="1000" dirty="0"/>
           </a:p>
@@ -46453,6 +46861,13 @@
   <p:clrMapOvr>
     <a:masterClrMapping/>
   </p:clrMapOvr>
+  <p:timing>
+    <p:tnLst>
+      <p:par>
+        <p:cTn xmlns:p14="http://schemas.microsoft.com/office/powerpoint/2010/main" id="1" dur="indefinite" restart="never" nodeType="tmRoot"/>
+      </p:par>
+    </p:tnLst>
+  </p:timing>
 </p:sld>
 </file>
 

</xml_diff>